<commit_message>
Update SMA et Traitement d’images.pptx
</commit_message>
<xml_diff>
--- a/SMA et Traitement d’images.pptx
+++ b/SMA et Traitement d’images.pptx
@@ -5,18 +5,19 @@
     <p:sldMasterId id="2147483738" r:id="rId1"/>
   </p:sldMasterIdLst>
   <p:notesMasterIdLst>
-    <p:notesMasterId r:id="rId11"/>
+    <p:notesMasterId r:id="rId12"/>
   </p:notesMasterIdLst>
   <p:sldIdLst>
     <p:sldId id="256" r:id="rId2"/>
     <p:sldId id="257" r:id="rId3"/>
     <p:sldId id="258" r:id="rId4"/>
     <p:sldId id="259" r:id="rId5"/>
-    <p:sldId id="261" r:id="rId6"/>
-    <p:sldId id="262" r:id="rId7"/>
-    <p:sldId id="260" r:id="rId8"/>
-    <p:sldId id="263" r:id="rId9"/>
-    <p:sldId id="264" r:id="rId10"/>
+    <p:sldId id="265" r:id="rId6"/>
+    <p:sldId id="261" r:id="rId7"/>
+    <p:sldId id="262" r:id="rId8"/>
+    <p:sldId id="260" r:id="rId9"/>
+    <p:sldId id="263" r:id="rId10"/>
+    <p:sldId id="264" r:id="rId11"/>
   </p:sldIdLst>
   <p:sldSz cx="12192000" cy="6858000"/>
   <p:notesSz cx="6858000" cy="9144000"/>
@@ -217,7 +218,7 @@
           <a:p>
             <a:fld id="{16112DA7-533D-4C97-AF83-2E85FB8DAC70}" type="datetimeFigureOut">
               <a:rPr lang="fr-FR" smtClean="0"/>
-              <a:t>13/01/2021</a:t>
+              <a:t>14/01/2021</a:t>
             </a:fld>
             <a:endParaRPr lang="fr-FR"/>
           </a:p>
@@ -669,7 +670,7 @@
           <a:p>
             <a:fld id="{F9B21E4B-C1CA-42B8-8F36-63F08AE9837C}" type="datetime1">
               <a:rPr lang="fr-FR" smtClean="0"/>
-              <a:t>13/01/2021</a:t>
+              <a:t>14/01/2021</a:t>
             </a:fld>
             <a:endParaRPr lang="fr-FR"/>
           </a:p>
@@ -967,7 +968,7 @@
           <a:p>
             <a:fld id="{8A2E183E-F211-4B52-8124-4A3365D4E00F}" type="datetime1">
               <a:rPr lang="fr-FR" smtClean="0"/>
-              <a:t>13/01/2021</a:t>
+              <a:t>14/01/2021</a:t>
             </a:fld>
             <a:endParaRPr lang="fr-FR"/>
           </a:p>
@@ -1159,7 +1160,7 @@
           <a:p>
             <a:fld id="{41B9C1E1-F6C3-4445-9C00-8ACD482BD8C9}" type="datetime1">
               <a:rPr lang="fr-FR" smtClean="0"/>
-              <a:t>13/01/2021</a:t>
+              <a:t>14/01/2021</a:t>
             </a:fld>
             <a:endParaRPr lang="fr-FR"/>
           </a:p>
@@ -1420,7 +1421,7 @@
           <a:p>
             <a:fld id="{CA68DD2E-A39E-4F3D-9567-21FE0BAD6D12}" type="datetime1">
               <a:rPr lang="fr-FR" smtClean="0"/>
-              <a:t>13/01/2021</a:t>
+              <a:t>14/01/2021</a:t>
             </a:fld>
             <a:endParaRPr lang="fr-FR"/>
           </a:p>
@@ -1844,7 +1845,7 @@
           <a:p>
             <a:fld id="{CC225EAC-9B05-4959-BC7A-8ACDF433931C}" type="datetime1">
               <a:rPr lang="fr-FR" smtClean="0"/>
-              <a:t>13/01/2021</a:t>
+              <a:t>14/01/2021</a:t>
             </a:fld>
             <a:endParaRPr lang="fr-FR"/>
           </a:p>
@@ -2381,7 +2382,7 @@
           <a:p>
             <a:fld id="{1ED5ED66-2183-42E2-9F71-A13AB7DEC956}" type="datetime1">
               <a:rPr lang="fr-FR" smtClean="0"/>
-              <a:t>13/01/2021</a:t>
+              <a:t>14/01/2021</a:t>
             </a:fld>
             <a:endParaRPr lang="fr-FR"/>
           </a:p>
@@ -3245,7 +3246,7 @@
           <a:p>
             <a:fld id="{6809890B-36E8-4515-BC55-1F09D6B978F1}" type="datetime1">
               <a:rPr lang="fr-FR" smtClean="0"/>
-              <a:t>13/01/2021</a:t>
+              <a:t>14/01/2021</a:t>
             </a:fld>
             <a:endParaRPr lang="fr-FR"/>
           </a:p>
@@ -3415,7 +3416,7 @@
           <a:p>
             <a:fld id="{200AD234-57B2-4CA6-B10A-30765D5C76D5}" type="datetime1">
               <a:rPr lang="fr-FR" smtClean="0"/>
-              <a:t>13/01/2021</a:t>
+              <a:t>14/01/2021</a:t>
             </a:fld>
             <a:endParaRPr lang="fr-FR"/>
           </a:p>
@@ -3599,7 +3600,7 @@
           <a:p>
             <a:fld id="{9DC955F0-C97C-4CFB-B186-84438E8EF2C8}" type="datetime1">
               <a:rPr lang="fr-FR" smtClean="0"/>
-              <a:t>13/01/2021</a:t>
+              <a:t>14/01/2021</a:t>
             </a:fld>
             <a:endParaRPr lang="fr-FR"/>
           </a:p>
@@ -3769,7 +3770,7 @@
           <a:p>
             <a:fld id="{2BF1FF26-517D-4CC2-B879-7ACBEB984238}" type="datetime1">
               <a:rPr lang="fr-FR" smtClean="0"/>
-              <a:t>13/01/2021</a:t>
+              <a:t>14/01/2021</a:t>
             </a:fld>
             <a:endParaRPr lang="fr-FR"/>
           </a:p>
@@ -4013,7 +4014,7 @@
           <a:p>
             <a:fld id="{D8482432-F18B-4AA8-A389-0B8A93A7B5DB}" type="datetime1">
               <a:rPr lang="fr-FR" smtClean="0"/>
-              <a:t>13/01/2021</a:t>
+              <a:t>14/01/2021</a:t>
             </a:fld>
             <a:endParaRPr lang="fr-FR"/>
           </a:p>
@@ -4249,7 +4250,7 @@
           <a:p>
             <a:fld id="{74FDAA70-8652-4C23-AC0F-BD2CE99FA6B2}" type="datetime1">
               <a:rPr lang="fr-FR" smtClean="0"/>
-              <a:t>13/01/2021</a:t>
+              <a:t>14/01/2021</a:t>
             </a:fld>
             <a:endParaRPr lang="fr-FR"/>
           </a:p>
@@ -4715,7 +4716,7 @@
           <a:p>
             <a:fld id="{F0645FD2-0503-4017-BE93-FDC57D4564BB}" type="datetime1">
               <a:rPr lang="fr-FR" smtClean="0"/>
-              <a:t>13/01/2021</a:t>
+              <a:t>14/01/2021</a:t>
             </a:fld>
             <a:endParaRPr lang="fr-FR"/>
           </a:p>
@@ -4833,7 +4834,7 @@
           <a:p>
             <a:fld id="{88E17F51-C23F-49C7-90C6-29634E96F222}" type="datetime1">
               <a:rPr lang="fr-FR" smtClean="0"/>
-              <a:t>13/01/2021</a:t>
+              <a:t>14/01/2021</a:t>
             </a:fld>
             <a:endParaRPr lang="fr-FR"/>
           </a:p>
@@ -4928,7 +4929,7 @@
           <a:p>
             <a:fld id="{DD2D5A4E-6A7F-4CC2-B205-E0107FDE9C33}" type="datetime1">
               <a:rPr lang="fr-FR" smtClean="0"/>
-              <a:t>13/01/2021</a:t>
+              <a:t>14/01/2021</a:t>
             </a:fld>
             <a:endParaRPr lang="fr-FR"/>
           </a:p>
@@ -5183,7 +5184,7 @@
           <a:p>
             <a:fld id="{565ADE32-46E3-4CA9-B4C4-CD5418F204CC}" type="datetime1">
               <a:rPr lang="fr-FR" smtClean="0"/>
-              <a:t>13/01/2021</a:t>
+              <a:t>14/01/2021</a:t>
             </a:fld>
             <a:endParaRPr lang="fr-FR"/>
           </a:p>
@@ -5483,7 +5484,7 @@
           <a:p>
             <a:fld id="{525D5AE3-CBBB-4A6B-917F-F9F2190B0AB3}" type="datetime1">
               <a:rPr lang="fr-FR" smtClean="0"/>
-              <a:t>13/01/2021</a:t>
+              <a:t>14/01/2021</a:t>
             </a:fld>
             <a:endParaRPr lang="fr-FR"/>
           </a:p>
@@ -5717,7 +5718,7 @@
           <a:p>
             <a:fld id="{CCDF7500-BB13-46AF-8A6F-532439BA27B8}" type="datetime1">
               <a:rPr lang="fr-FR" smtClean="0"/>
-              <a:t>13/01/2021</a:t>
+              <a:t>14/01/2021</a:t>
             </a:fld>
             <a:endParaRPr lang="fr-FR"/>
           </a:p>
@@ -6641,6 +6642,197 @@
 </p:sld>
 </file>
 
+<file path=ppt/slides/slide10.xml><?xml version="1.0" encoding="utf-8"?>
+<p:sld xmlns:a="http://schemas.openxmlformats.org/drawingml/2006/main" xmlns:r="http://schemas.openxmlformats.org/officeDocument/2006/relationships" xmlns:p="http://schemas.openxmlformats.org/presentationml/2006/main">
+  <p:cSld>
+    <p:spTree>
+      <p:nvGrpSpPr>
+        <p:cNvPr id="1" name=""/>
+        <p:cNvGrpSpPr/>
+        <p:nvPr/>
+      </p:nvGrpSpPr>
+      <p:grpSpPr>
+        <a:xfrm>
+          <a:off x="0" y="0"/>
+          <a:ext cx="0" cy="0"/>
+          <a:chOff x="0" y="0"/>
+          <a:chExt cx="0" cy="0"/>
+        </a:xfrm>
+      </p:grpSpPr>
+      <p:sp>
+        <p:nvSpPr>
+          <p:cNvPr id="4" name="Titre 3">
+            <a:extLst>
+              <a:ext uri="{FF2B5EF4-FFF2-40B4-BE49-F238E27FC236}">
+                <a16:creationId xmlns:a16="http://schemas.microsoft.com/office/drawing/2014/main" id="{6636789D-216E-47CF-8022-A15E6AB6C752}"/>
+              </a:ext>
+            </a:extLst>
+          </p:cNvPr>
+          <p:cNvSpPr>
+            <a:spLocks noGrp="1"/>
+          </p:cNvSpPr>
+          <p:nvPr>
+            <p:ph type="ctrTitle"/>
+          </p:nvPr>
+        </p:nvSpPr>
+        <p:spPr/>
+        <p:txBody>
+          <a:bodyPr/>
+          <a:lstStyle/>
+          <a:p>
+            <a:br>
+              <a:rPr lang="fr-FR" dirty="0"/>
+            </a:br>
+            <a:r>
+              <a:rPr lang="fr-FR" dirty="0"/>
+              <a:t>Merci de votre écoute</a:t>
+            </a:r>
+          </a:p>
+        </p:txBody>
+      </p:sp>
+      <p:sp>
+        <p:nvSpPr>
+          <p:cNvPr id="5" name="Sous-titre 4">
+            <a:extLst>
+              <a:ext uri="{FF2B5EF4-FFF2-40B4-BE49-F238E27FC236}">
+                <a16:creationId xmlns:a16="http://schemas.microsoft.com/office/drawing/2014/main" id="{D69341EB-267D-4A8E-B7AF-7CAB03078F33}"/>
+              </a:ext>
+            </a:extLst>
+          </p:cNvPr>
+          <p:cNvSpPr>
+            <a:spLocks noGrp="1"/>
+          </p:cNvSpPr>
+          <p:nvPr>
+            <p:ph type="subTitle" idx="1"/>
+          </p:nvPr>
+        </p:nvSpPr>
+        <p:spPr/>
+        <p:txBody>
+          <a:bodyPr/>
+          <a:lstStyle/>
+          <a:p>
+            <a:r>
+              <a:rPr lang="fr-FR" dirty="0"/>
+              <a:t>Maintenant place à la démonstration…</a:t>
+            </a:r>
+          </a:p>
+        </p:txBody>
+      </p:sp>
+      <p:pic>
+        <p:nvPicPr>
+          <p:cNvPr id="6" name="Image 5">
+            <a:extLst>
+              <a:ext uri="{FF2B5EF4-FFF2-40B4-BE49-F238E27FC236}">
+                <a16:creationId xmlns:a16="http://schemas.microsoft.com/office/drawing/2014/main" id="{5E98EF6D-A133-425E-86B4-0379E08D791C}"/>
+              </a:ext>
+            </a:extLst>
+          </p:cNvPr>
+          <p:cNvPicPr>
+            <a:picLocks noChangeAspect="1"/>
+          </p:cNvPicPr>
+          <p:nvPr/>
+        </p:nvPicPr>
+        <p:blipFill rotWithShape="1">
+          <a:blip r:embed="rId2">
+            <a:extLst>
+              <a:ext uri="{28A0092B-C50C-407E-A947-70E740481C1C}">
+                <a14:useLocalDpi xmlns:a14="http://schemas.microsoft.com/office/drawing/2010/main" val="0"/>
+              </a:ext>
+            </a:extLst>
+          </a:blip>
+          <a:srcRect l="6737" t="13286" r="6690" b="12260"/>
+          <a:stretch/>
+        </p:blipFill>
+        <p:spPr>
+          <a:xfrm>
+            <a:off x="7385481" y="1072679"/>
+            <a:ext cx="2997457" cy="1393722"/>
+          </a:xfrm>
+          <a:prstGeom prst="rect">
+            <a:avLst/>
+          </a:prstGeom>
+        </p:spPr>
+      </p:pic>
+      <p:pic>
+        <p:nvPicPr>
+          <p:cNvPr id="8" name="Image 7">
+            <a:extLst>
+              <a:ext uri="{FF2B5EF4-FFF2-40B4-BE49-F238E27FC236}">
+                <a16:creationId xmlns:a16="http://schemas.microsoft.com/office/drawing/2014/main" id="{2AC1CEFE-D90F-4326-A189-B6ADBB983B02}"/>
+              </a:ext>
+            </a:extLst>
+          </p:cNvPr>
+          <p:cNvPicPr>
+            <a:picLocks noChangeAspect="1"/>
+          </p:cNvPicPr>
+          <p:nvPr/>
+        </p:nvPicPr>
+        <p:blipFill>
+          <a:blip r:embed="rId3">
+            <a:extLst>
+              <a:ext uri="{28A0092B-C50C-407E-A947-70E740481C1C}">
+                <a14:useLocalDpi xmlns:a14="http://schemas.microsoft.com/office/drawing/2010/main" val="0"/>
+              </a:ext>
+            </a:extLst>
+          </a:blip>
+          <a:srcRect/>
+          <a:stretch/>
+        </p:blipFill>
+        <p:spPr>
+          <a:xfrm>
+            <a:off x="1809062" y="1233375"/>
+            <a:ext cx="2997457" cy="1233026"/>
+          </a:xfrm>
+          <a:prstGeom prst="rect">
+            <a:avLst/>
+          </a:prstGeom>
+        </p:spPr>
+      </p:pic>
+      <p:sp>
+        <p:nvSpPr>
+          <p:cNvPr id="9" name="Espace réservé du numéro de diapositive 8">
+            <a:extLst>
+              <a:ext uri="{FF2B5EF4-FFF2-40B4-BE49-F238E27FC236}">
+                <a16:creationId xmlns:a16="http://schemas.microsoft.com/office/drawing/2014/main" id="{FDABCA79-13BB-4AA1-9553-DD587F1BFCA8}"/>
+              </a:ext>
+            </a:extLst>
+          </p:cNvPr>
+          <p:cNvSpPr>
+            <a:spLocks noGrp="1"/>
+          </p:cNvSpPr>
+          <p:nvPr>
+            <p:ph type="sldNum" sz="quarter" idx="12"/>
+          </p:nvPr>
+        </p:nvSpPr>
+        <p:spPr/>
+        <p:txBody>
+          <a:bodyPr/>
+          <a:lstStyle/>
+          <a:p>
+            <a:fld id="{B436B6B1-DD6A-46C0-8E67-7AD950CB5C42}" type="slidenum">
+              <a:rPr lang="fr-FR" smtClean="0"/>
+              <a:t>10</a:t>
+            </a:fld>
+            <a:r>
+              <a:rPr lang="fr-FR" dirty="0"/>
+              <a:t>/9</a:t>
+            </a:r>
+          </a:p>
+        </p:txBody>
+      </p:sp>
+    </p:spTree>
+    <p:extLst>
+      <p:ext uri="{BB962C8B-B14F-4D97-AF65-F5344CB8AC3E}">
+        <p14:creationId xmlns:p14="http://schemas.microsoft.com/office/powerpoint/2010/main" val="1740739463"/>
+      </p:ext>
+    </p:extLst>
+  </p:cSld>
+  <p:clrMapOvr>
+    <a:masterClrMapping/>
+  </p:clrMapOvr>
+</p:sld>
+</file>
+
 <file path=ppt/slides/slide2.xml><?xml version="1.0" encoding="utf-8"?>
 <p:sld xmlns:a="http://schemas.openxmlformats.org/drawingml/2006/main" xmlns:r="http://schemas.openxmlformats.org/officeDocument/2006/relationships" xmlns:p="http://schemas.openxmlformats.org/presentationml/2006/main">
   <p:cSld>
@@ -6716,6 +6908,12 @@
             <a:r>
               <a:rPr lang="fr-FR" sz="2800" dirty="0"/>
               <a:t>Notre approche</a:t>
+            </a:r>
+          </a:p>
+          <a:p>
+            <a:r>
+              <a:rPr lang="fr-FR" sz="2800" dirty="0"/>
+              <a:t>Implémentation</a:t>
             </a:r>
           </a:p>
           <a:p>
@@ -7490,7 +7688,7 @@
           <p:cNvPr id="2" name="Titre 1">
             <a:extLst>
               <a:ext uri="{FF2B5EF4-FFF2-40B4-BE49-F238E27FC236}">
-                <a16:creationId xmlns:a16="http://schemas.microsoft.com/office/drawing/2014/main" id="{43DD0991-2FC0-4D1E-80CF-E17B3AE90DB6}"/>
+                <a16:creationId xmlns:a16="http://schemas.microsoft.com/office/drawing/2014/main" id="{C1E54CDC-D1A9-4288-9BD0-59383D071F56}"/>
               </a:ext>
             </a:extLst>
           </p:cNvPr>
@@ -7501,404 +7699,112 @@
             <p:ph type="title"/>
           </p:nvPr>
         </p:nvSpPr>
-        <p:spPr>
-          <a:xfrm>
-            <a:off x="913795" y="609600"/>
-            <a:ext cx="10353762" cy="820834"/>
-          </a:xfrm>
-        </p:spPr>
+        <p:spPr/>
         <p:txBody>
           <a:bodyPr/>
           <a:lstStyle/>
           <a:p>
             <a:r>
               <a:rPr lang="fr-FR" dirty="0"/>
-              <a:t>Nos résultats</a:t>
-            </a:r>
+              <a:t>Implémentation</a:t>
+            </a:r>
+          </a:p>
+        </p:txBody>
+      </p:sp>
+      <p:sp>
+        <p:nvSpPr>
+          <p:cNvPr id="3" name="Espace réservé du contenu 2">
+            <a:extLst>
+              <a:ext uri="{FF2B5EF4-FFF2-40B4-BE49-F238E27FC236}">
+                <a16:creationId xmlns:a16="http://schemas.microsoft.com/office/drawing/2014/main" id="{ECA95D27-3014-4208-9A9A-3F71FA05AB80}"/>
+              </a:ext>
+            </a:extLst>
+          </p:cNvPr>
+          <p:cNvSpPr>
+            <a:spLocks noGrp="1"/>
+          </p:cNvSpPr>
+          <p:nvPr>
+            <p:ph idx="1"/>
+          </p:nvPr>
+        </p:nvSpPr>
+        <p:spPr>
+          <a:xfrm>
+            <a:off x="1178560" y="1732448"/>
+            <a:ext cx="5845593" cy="4058751"/>
+          </a:xfrm>
+        </p:spPr>
+        <p:txBody>
+          <a:bodyPr/>
+          <a:lstStyle/>
+          <a:p>
+            <a:r>
+              <a:rPr lang="fr-FR" dirty="0"/>
+              <a:t>Librairies utilisées :</a:t>
+            </a:r>
+          </a:p>
+          <a:p>
+            <a:pPr lvl="1"/>
+            <a:r>
+              <a:rPr lang="fr-FR" dirty="0"/>
+              <a:t>Gestion des agents</a:t>
+            </a:r>
+          </a:p>
+          <a:p>
+            <a:pPr lvl="2"/>
+            <a:r>
+              <a:rPr lang="fr-FR" dirty="0" err="1"/>
+              <a:t>Scheduler</a:t>
+            </a:r>
+            <a:endParaRPr lang="fr-FR" dirty="0"/>
+          </a:p>
+          <a:p>
+            <a:pPr lvl="2"/>
+            <a:r>
+              <a:rPr lang="fr-FR" dirty="0"/>
+              <a:t>Agent</a:t>
+            </a:r>
+          </a:p>
+          <a:p>
+            <a:pPr lvl="2"/>
+            <a:r>
+              <a:rPr lang="fr-FR" dirty="0"/>
+              <a:t>Message</a:t>
+            </a:r>
+          </a:p>
+          <a:p>
+            <a:pPr lvl="1"/>
+            <a:r>
+              <a:rPr lang="fr-FR" dirty="0"/>
+              <a:t>Gestion des images</a:t>
+            </a:r>
+          </a:p>
+          <a:p>
+            <a:pPr lvl="2"/>
+            <a:r>
+              <a:rPr lang="fr-FR" dirty="0"/>
+              <a:t>Image</a:t>
+            </a:r>
+          </a:p>
+          <a:p>
+            <a:pPr lvl="2"/>
+            <a:r>
+              <a:rPr lang="fr-FR" dirty="0" err="1"/>
+              <a:t>ImageRVB</a:t>
+            </a:r>
+            <a:endParaRPr lang="fr-FR" dirty="0"/>
+          </a:p>
+          <a:p>
+            <a:pPr lvl="1"/>
+            <a:endParaRPr lang="fr-FR" dirty="0"/>
           </a:p>
         </p:txBody>
       </p:sp>
       <p:pic>
         <p:nvPicPr>
-          <p:cNvPr id="4" name="Image 3">
+          <p:cNvPr id="6" name="Image 5">
             <a:extLst>
               <a:ext uri="{FF2B5EF4-FFF2-40B4-BE49-F238E27FC236}">
-                <a16:creationId xmlns:a16="http://schemas.microsoft.com/office/drawing/2014/main" id="{C01CA5F1-2AA6-4A9C-88AB-4062CE7D2C93}"/>
-              </a:ext>
-            </a:extLst>
-          </p:cNvPr>
-          <p:cNvPicPr/>
-          <p:nvPr/>
-        </p:nvPicPr>
-        <p:blipFill>
-          <a:blip r:embed="rId2" cstate="print">
-            <a:extLst>
-              <a:ext uri="{28A0092B-C50C-407E-A947-70E740481C1C}">
-                <a14:useLocalDpi xmlns:a14="http://schemas.microsoft.com/office/drawing/2010/main" val="0"/>
-              </a:ext>
-            </a:extLst>
-          </a:blip>
-          <a:stretch>
-            <a:fillRect/>
-          </a:stretch>
-        </p:blipFill>
-        <p:spPr>
-          <a:xfrm>
-            <a:off x="845536" y="3150541"/>
-            <a:ext cx="2924845" cy="2121454"/>
-          </a:xfrm>
-          <a:prstGeom prst="rect">
-            <a:avLst/>
-          </a:prstGeom>
-        </p:spPr>
-      </p:pic>
-      <p:pic>
-        <p:nvPicPr>
-          <p:cNvPr id="5" name="Image 4">
-            <a:extLst>
-              <a:ext uri="{FF2B5EF4-FFF2-40B4-BE49-F238E27FC236}">
-                <a16:creationId xmlns:a16="http://schemas.microsoft.com/office/drawing/2014/main" id="{3C7A9D5E-7FC5-4E07-8561-2864D2DEBCFE}"/>
-              </a:ext>
-            </a:extLst>
-          </p:cNvPr>
-          <p:cNvPicPr/>
-          <p:nvPr/>
-        </p:nvPicPr>
-        <p:blipFill rotWithShape="1">
-          <a:blip r:embed="rId3">
-            <a:extLst>
-              <a:ext uri="{28A0092B-C50C-407E-A947-70E740481C1C}">
-                <a14:useLocalDpi xmlns:a14="http://schemas.microsoft.com/office/drawing/2010/main" val="0"/>
-              </a:ext>
-            </a:extLst>
-          </a:blip>
-          <a:srcRect l="3486" t="3876" r="1917" b="3489"/>
-          <a:stretch/>
-        </p:blipFill>
-        <p:spPr bwMode="auto">
-          <a:xfrm>
-            <a:off x="4310929" y="3150541"/>
-            <a:ext cx="3132178" cy="2121444"/>
-          </a:xfrm>
-          <a:prstGeom prst="rect">
-            <a:avLst/>
-          </a:prstGeom>
-          <a:ln>
-            <a:noFill/>
-          </a:ln>
-          <a:extLst>
-            <a:ext uri="{53640926-AAD7-44D8-BBD7-CCE9431645EC}">
-              <a14:shadowObscured xmlns:a14="http://schemas.microsoft.com/office/drawing/2010/main"/>
-            </a:ext>
-          </a:extLst>
-        </p:spPr>
-      </p:pic>
-      <p:pic>
-        <p:nvPicPr>
-          <p:cNvPr id="7" name="Image 6">
-            <a:extLst>
-              <a:ext uri="{FF2B5EF4-FFF2-40B4-BE49-F238E27FC236}">
-                <a16:creationId xmlns:a16="http://schemas.microsoft.com/office/drawing/2014/main" id="{8C608961-6B02-48E8-B22F-71D7BA5AC792}"/>
-              </a:ext>
-            </a:extLst>
-          </p:cNvPr>
-          <p:cNvPicPr/>
-          <p:nvPr/>
-        </p:nvPicPr>
-        <p:blipFill>
-          <a:blip r:embed="rId4" cstate="print">
-            <a:extLst>
-              <a:ext uri="{28A0092B-C50C-407E-A947-70E740481C1C}">
-                <a14:useLocalDpi xmlns:a14="http://schemas.microsoft.com/office/drawing/2010/main" val="0"/>
-              </a:ext>
-            </a:extLst>
-          </a:blip>
-          <a:stretch>
-            <a:fillRect/>
-          </a:stretch>
-        </p:blipFill>
-        <p:spPr>
-          <a:xfrm>
-            <a:off x="8266588" y="4185787"/>
-            <a:ext cx="2930713" cy="2126489"/>
-          </a:xfrm>
-          <a:prstGeom prst="rect">
-            <a:avLst/>
-          </a:prstGeom>
-        </p:spPr>
-      </p:pic>
-      <p:sp>
-        <p:nvSpPr>
-          <p:cNvPr id="8" name="Rectangle 7">
-            <a:extLst>
-              <a:ext uri="{FF2B5EF4-FFF2-40B4-BE49-F238E27FC236}">
-                <a16:creationId xmlns:a16="http://schemas.microsoft.com/office/drawing/2014/main" id="{8A7F89A8-E86A-40E2-9C84-A3A90959970C}"/>
-              </a:ext>
-            </a:extLst>
-          </p:cNvPr>
-          <p:cNvSpPr/>
-          <p:nvPr/>
-        </p:nvSpPr>
-        <p:spPr>
-          <a:xfrm>
-            <a:off x="692458" y="1367921"/>
-            <a:ext cx="10963922" cy="5104646"/>
-          </a:xfrm>
-          <a:prstGeom prst="rect">
-            <a:avLst/>
-          </a:prstGeom>
-          <a:noFill/>
-        </p:spPr>
-        <p:style>
-          <a:lnRef idx="2">
-            <a:schemeClr val="accent1">
-              <a:shade val="50000"/>
-            </a:schemeClr>
-          </a:lnRef>
-          <a:fillRef idx="1">
-            <a:schemeClr val="accent1"/>
-          </a:fillRef>
-          <a:effectRef idx="0">
-            <a:schemeClr val="accent1"/>
-          </a:effectRef>
-          <a:fontRef idx="minor">
-            <a:schemeClr val="lt1"/>
-          </a:fontRef>
-        </p:style>
-        <p:txBody>
-          <a:bodyPr rtlCol="0" anchor="ctr"/>
-          <a:lstStyle/>
-          <a:p>
-            <a:pPr algn="ctr"/>
-            <a:endParaRPr lang="fr-FR"/>
-          </a:p>
-        </p:txBody>
-      </p:sp>
-      <p:cxnSp>
-        <p:nvCxnSpPr>
-          <p:cNvPr id="10" name="Connecteur droit 9">
-            <a:extLst>
-              <a:ext uri="{FF2B5EF4-FFF2-40B4-BE49-F238E27FC236}">
-                <a16:creationId xmlns:a16="http://schemas.microsoft.com/office/drawing/2014/main" id="{4162DFC5-F52D-4813-9B70-4337A4C02091}"/>
-              </a:ext>
-            </a:extLst>
-          </p:cNvPr>
-          <p:cNvCxnSpPr>
-            <a:cxnSpLocks/>
-          </p:cNvCxnSpPr>
-          <p:nvPr/>
-        </p:nvCxnSpPr>
-        <p:spPr>
-          <a:xfrm>
-            <a:off x="3950564" y="1367920"/>
-            <a:ext cx="0" cy="5104646"/>
-          </a:xfrm>
-          <a:prstGeom prst="line">
-            <a:avLst/>
-          </a:prstGeom>
-        </p:spPr>
-        <p:style>
-          <a:lnRef idx="1">
-            <a:schemeClr val="accent1"/>
-          </a:lnRef>
-          <a:fillRef idx="0">
-            <a:schemeClr val="accent1"/>
-          </a:fillRef>
-          <a:effectRef idx="0">
-            <a:schemeClr val="accent1"/>
-          </a:effectRef>
-          <a:fontRef idx="minor">
-            <a:schemeClr val="tx1"/>
-          </a:fontRef>
-        </p:style>
-      </p:cxnSp>
-      <p:cxnSp>
-        <p:nvCxnSpPr>
-          <p:cNvPr id="12" name="Connecteur droit 11">
-            <a:extLst>
-              <a:ext uri="{FF2B5EF4-FFF2-40B4-BE49-F238E27FC236}">
-                <a16:creationId xmlns:a16="http://schemas.microsoft.com/office/drawing/2014/main" id="{A8E9B3F2-4ED7-4B01-A997-88180F97387F}"/>
-              </a:ext>
-            </a:extLst>
-          </p:cNvPr>
-          <p:cNvCxnSpPr>
-            <a:cxnSpLocks/>
-          </p:cNvCxnSpPr>
-          <p:nvPr/>
-        </p:nvCxnSpPr>
-        <p:spPr>
-          <a:xfrm flipH="1">
-            <a:off x="692459" y="1920020"/>
-            <a:ext cx="10963921" cy="0"/>
-          </a:xfrm>
-          <a:prstGeom prst="line">
-            <a:avLst/>
-          </a:prstGeom>
-        </p:spPr>
-        <p:style>
-          <a:lnRef idx="1">
-            <a:schemeClr val="accent1"/>
-          </a:lnRef>
-          <a:fillRef idx="0">
-            <a:schemeClr val="accent1"/>
-          </a:fillRef>
-          <a:effectRef idx="0">
-            <a:schemeClr val="accent1"/>
-          </a:effectRef>
-          <a:fontRef idx="minor">
-            <a:schemeClr val="tx1"/>
-          </a:fontRef>
-        </p:style>
-      </p:cxnSp>
-      <p:sp>
-        <p:nvSpPr>
-          <p:cNvPr id="17" name="ZoneTexte 16">
-            <a:extLst>
-              <a:ext uri="{FF2B5EF4-FFF2-40B4-BE49-F238E27FC236}">
-                <a16:creationId xmlns:a16="http://schemas.microsoft.com/office/drawing/2014/main" id="{4F046821-D645-4208-9BE4-3784CCD67EBD}"/>
-              </a:ext>
-            </a:extLst>
-          </p:cNvPr>
-          <p:cNvSpPr txBox="1"/>
-          <p:nvPr/>
-        </p:nvSpPr>
-        <p:spPr>
-          <a:xfrm>
-            <a:off x="1950925" y="1462084"/>
-            <a:ext cx="714066" cy="369332"/>
-          </a:xfrm>
-          <a:prstGeom prst="rect">
-            <a:avLst/>
-          </a:prstGeom>
-          <a:noFill/>
-        </p:spPr>
-        <p:txBody>
-          <a:bodyPr wrap="square" rtlCol="0">
-            <a:spAutoFit/>
-          </a:bodyPr>
-          <a:lstStyle/>
-          <a:p>
-            <a:r>
-              <a:rPr lang="fr-FR" dirty="0"/>
-              <a:t>Input</a:t>
-            </a:r>
-          </a:p>
-        </p:txBody>
-      </p:sp>
-      <p:sp>
-        <p:nvSpPr>
-          <p:cNvPr id="18" name="ZoneTexte 17">
-            <a:extLst>
-              <a:ext uri="{FF2B5EF4-FFF2-40B4-BE49-F238E27FC236}">
-                <a16:creationId xmlns:a16="http://schemas.microsoft.com/office/drawing/2014/main" id="{DEF26022-4D7B-4BB7-B147-0B621CC29FCF}"/>
-              </a:ext>
-            </a:extLst>
-          </p:cNvPr>
-          <p:cNvSpPr txBox="1"/>
-          <p:nvPr/>
-        </p:nvSpPr>
-        <p:spPr>
-          <a:xfrm>
-            <a:off x="4687397" y="1459305"/>
-            <a:ext cx="2379241" cy="369332"/>
-          </a:xfrm>
-          <a:prstGeom prst="rect">
-            <a:avLst/>
-          </a:prstGeom>
-          <a:noFill/>
-        </p:spPr>
-        <p:txBody>
-          <a:bodyPr wrap="square" rtlCol="0">
-            <a:spAutoFit/>
-          </a:bodyPr>
-          <a:lstStyle/>
-          <a:p>
-            <a:r>
-              <a:rPr lang="fr-FR" dirty="0"/>
-              <a:t>Résultats dans l’article</a:t>
-            </a:r>
-          </a:p>
-        </p:txBody>
-      </p:sp>
-      <p:sp>
-        <p:nvSpPr>
-          <p:cNvPr id="19" name="ZoneTexte 18">
-            <a:extLst>
-              <a:ext uri="{FF2B5EF4-FFF2-40B4-BE49-F238E27FC236}">
-                <a16:creationId xmlns:a16="http://schemas.microsoft.com/office/drawing/2014/main" id="{85F3571F-EE74-4F65-8687-23E4CE9E61A6}"/>
-              </a:ext>
-            </a:extLst>
-          </p:cNvPr>
-          <p:cNvSpPr txBox="1"/>
-          <p:nvPr/>
-        </p:nvSpPr>
-        <p:spPr>
-          <a:xfrm>
-            <a:off x="9005208" y="1453049"/>
-            <a:ext cx="1449436" cy="369332"/>
-          </a:xfrm>
-          <a:prstGeom prst="rect">
-            <a:avLst/>
-          </a:prstGeom>
-          <a:noFill/>
-        </p:spPr>
-        <p:txBody>
-          <a:bodyPr wrap="square" rtlCol="0">
-            <a:spAutoFit/>
-          </a:bodyPr>
-          <a:lstStyle/>
-          <a:p>
-            <a:r>
-              <a:rPr lang="fr-FR" dirty="0"/>
-              <a:t>Nos résultats</a:t>
-            </a:r>
-          </a:p>
-        </p:txBody>
-      </p:sp>
-      <p:cxnSp>
-        <p:nvCxnSpPr>
-          <p:cNvPr id="20" name="Connecteur droit 19">
-            <a:extLst>
-              <a:ext uri="{FF2B5EF4-FFF2-40B4-BE49-F238E27FC236}">
-                <a16:creationId xmlns:a16="http://schemas.microsoft.com/office/drawing/2014/main" id="{BB2C05A3-B939-4919-B45E-EE7E95C3F6E8}"/>
-              </a:ext>
-            </a:extLst>
-          </p:cNvPr>
-          <p:cNvCxnSpPr>
-            <a:cxnSpLocks/>
-          </p:cNvCxnSpPr>
-          <p:nvPr/>
-        </p:nvCxnSpPr>
-        <p:spPr>
-          <a:xfrm>
-            <a:off x="7803472" y="1351280"/>
-            <a:ext cx="1" cy="5104646"/>
-          </a:xfrm>
-          <a:prstGeom prst="line">
-            <a:avLst/>
-          </a:prstGeom>
-        </p:spPr>
-        <p:style>
-          <a:lnRef idx="1">
-            <a:schemeClr val="accent1"/>
-          </a:lnRef>
-          <a:fillRef idx="0">
-            <a:schemeClr val="accent1"/>
-          </a:fillRef>
-          <a:effectRef idx="0">
-            <a:schemeClr val="accent1"/>
-          </a:effectRef>
-          <a:fontRef idx="minor">
-            <a:schemeClr val="tx1"/>
-          </a:fontRef>
-        </p:style>
-      </p:cxnSp>
-      <p:pic>
-        <p:nvPicPr>
-          <p:cNvPr id="26" name="Image 25">
-            <a:extLst>
-              <a:ext uri="{FF2B5EF4-FFF2-40B4-BE49-F238E27FC236}">
-                <a16:creationId xmlns:a16="http://schemas.microsoft.com/office/drawing/2014/main" id="{AE8CA53B-CB54-465D-947A-86001DD8B11B}"/>
+                <a16:creationId xmlns:a16="http://schemas.microsoft.com/office/drawing/2014/main" id="{FB677244-2EC0-4FE2-AA4A-F33E7727DDED}"/>
               </a:ext>
             </a:extLst>
           </p:cNvPr>
@@ -7908,14 +7814,20 @@
           <p:nvPr/>
         </p:nvPicPr>
         <p:blipFill rotWithShape="1">
-          <a:blip r:embed="rId5"/>
-          <a:srcRect t="3733"/>
+          <a:blip r:embed="rId2">
+            <a:extLst>
+              <a:ext uri="{28A0092B-C50C-407E-A947-70E740481C1C}">
+                <a14:useLocalDpi xmlns:a14="http://schemas.microsoft.com/office/drawing/2010/main" val="0"/>
+              </a:ext>
+            </a:extLst>
+          </a:blip>
+          <a:srcRect l="6737" t="13286" r="6690" b="12260"/>
           <a:stretch/>
         </p:blipFill>
         <p:spPr>
           <a:xfrm>
-            <a:off x="8262552" y="2029360"/>
-            <a:ext cx="2934749" cy="2047088"/>
+            <a:off x="10368379" y="466305"/>
+            <a:ext cx="1595120" cy="741680"/>
           </a:xfrm>
           <a:prstGeom prst="rect">
             <a:avLst/>
@@ -7924,10 +7836,77 @@
       </p:pic>
       <p:pic>
         <p:nvPicPr>
-          <p:cNvPr id="14" name="Image 13">
+          <p:cNvPr id="9" name="Image 8">
             <a:extLst>
               <a:ext uri="{FF2B5EF4-FFF2-40B4-BE49-F238E27FC236}">
-                <a16:creationId xmlns:a16="http://schemas.microsoft.com/office/drawing/2014/main" id="{698695CF-25A5-4142-910D-372FDCDAB148}"/>
+                <a16:creationId xmlns:a16="http://schemas.microsoft.com/office/drawing/2014/main" id="{CACBE9E8-1CD4-4390-B6DD-4F1ED1EAF2C2}"/>
+              </a:ext>
+            </a:extLst>
+          </p:cNvPr>
+          <p:cNvPicPr>
+            <a:picLocks noChangeAspect="1"/>
+          </p:cNvPicPr>
+          <p:nvPr/>
+        </p:nvPicPr>
+        <p:blipFill>
+          <a:blip r:embed="rId3">
+            <a:extLst>
+              <a:ext uri="{28A0092B-C50C-407E-A947-70E740481C1C}">
+                <a14:useLocalDpi xmlns:a14="http://schemas.microsoft.com/office/drawing/2010/main" val="0"/>
+              </a:ext>
+            </a:extLst>
+          </a:blip>
+          <a:srcRect/>
+          <a:stretch/>
+        </p:blipFill>
+        <p:spPr>
+          <a:xfrm>
+            <a:off x="381000" y="510248"/>
+            <a:ext cx="1595120" cy="656164"/>
+          </a:xfrm>
+          <a:prstGeom prst="rect">
+            <a:avLst/>
+          </a:prstGeom>
+        </p:spPr>
+      </p:pic>
+      <p:sp>
+        <p:nvSpPr>
+          <p:cNvPr id="4" name="Espace réservé du numéro de diapositive 3">
+            <a:extLst>
+              <a:ext uri="{FF2B5EF4-FFF2-40B4-BE49-F238E27FC236}">
+                <a16:creationId xmlns:a16="http://schemas.microsoft.com/office/drawing/2014/main" id="{9F1C5C77-7AF1-4E55-A6E7-031057B1B169}"/>
+              </a:ext>
+            </a:extLst>
+          </p:cNvPr>
+          <p:cNvSpPr>
+            <a:spLocks noGrp="1"/>
+          </p:cNvSpPr>
+          <p:nvPr>
+            <p:ph type="sldNum" sz="quarter" idx="12"/>
+          </p:nvPr>
+        </p:nvSpPr>
+        <p:spPr/>
+        <p:txBody>
+          <a:bodyPr/>
+          <a:lstStyle/>
+          <a:p>
+            <a:fld id="{B436B6B1-DD6A-46C0-8E67-7AD950CB5C42}" type="slidenum">
+              <a:rPr lang="fr-FR" smtClean="0"/>
+              <a:t>5</a:t>
+            </a:fld>
+            <a:r>
+              <a:rPr lang="fr-FR" dirty="0"/>
+              <a:t>/9</a:t>
+            </a:r>
+          </a:p>
+        </p:txBody>
+      </p:sp>
+      <p:pic>
+        <p:nvPicPr>
+          <p:cNvPr id="12" name="Image 11">
+            <a:extLst>
+              <a:ext uri="{FF2B5EF4-FFF2-40B4-BE49-F238E27FC236}">
+                <a16:creationId xmlns:a16="http://schemas.microsoft.com/office/drawing/2014/main" id="{40075312-AECC-4169-8F03-A84EA6213987}"/>
               </a:ext>
             </a:extLst>
           </p:cNvPr>
@@ -7937,102 +7916,30 @@
           <p:nvPr/>
         </p:nvPicPr>
         <p:blipFill rotWithShape="1">
-          <a:blip r:embed="rId6">
+          <a:blip r:embed="rId4">
             <a:extLst>
               <a:ext uri="{28A0092B-C50C-407E-A947-70E740481C1C}">
                 <a14:useLocalDpi xmlns:a14="http://schemas.microsoft.com/office/drawing/2010/main" val="0"/>
               </a:ext>
             </a:extLst>
           </a:blip>
-          <a:srcRect l="6737" t="13286" r="6690" b="12260"/>
+          <a:srcRect l="67119" t="3757" r="3426" b="31370"/>
           <a:stretch/>
         </p:blipFill>
         <p:spPr>
           <a:xfrm>
-            <a:off x="10368379" y="466305"/>
-            <a:ext cx="1595120" cy="741680"/>
+            <a:off x="8107795" y="1477324"/>
+            <a:ext cx="2074522" cy="4568998"/>
           </a:xfrm>
           <a:prstGeom prst="rect">
             <a:avLst/>
           </a:prstGeom>
         </p:spPr>
       </p:pic>
-      <p:pic>
-        <p:nvPicPr>
-          <p:cNvPr id="16" name="Image 15">
-            <a:extLst>
-              <a:ext uri="{FF2B5EF4-FFF2-40B4-BE49-F238E27FC236}">
-                <a16:creationId xmlns:a16="http://schemas.microsoft.com/office/drawing/2014/main" id="{DAC8FB30-64BB-45CC-9E00-960912287D32}"/>
-              </a:ext>
-            </a:extLst>
-          </p:cNvPr>
-          <p:cNvPicPr>
-            <a:picLocks noChangeAspect="1"/>
-          </p:cNvPicPr>
-          <p:nvPr/>
-        </p:nvPicPr>
-        <p:blipFill>
-          <a:blip r:embed="rId7">
-            <a:extLst>
-              <a:ext uri="{28A0092B-C50C-407E-A947-70E740481C1C}">
-                <a14:useLocalDpi xmlns:a14="http://schemas.microsoft.com/office/drawing/2010/main" val="0"/>
-              </a:ext>
-            </a:extLst>
-          </a:blip>
-          <a:srcRect/>
-          <a:stretch/>
-        </p:blipFill>
-        <p:spPr>
-          <a:xfrm>
-            <a:off x="381000" y="510248"/>
-            <a:ext cx="1595120" cy="656164"/>
-          </a:xfrm>
-          <a:prstGeom prst="rect">
-            <a:avLst/>
-          </a:prstGeom>
-        </p:spPr>
-      </p:pic>
-      <p:sp>
-        <p:nvSpPr>
-          <p:cNvPr id="3" name="Espace réservé du numéro de diapositive 2">
-            <a:extLst>
-              <a:ext uri="{FF2B5EF4-FFF2-40B4-BE49-F238E27FC236}">
-                <a16:creationId xmlns:a16="http://schemas.microsoft.com/office/drawing/2014/main" id="{9AEF0DBC-8410-40C6-8067-F80F8B9EEB42}"/>
-              </a:ext>
-            </a:extLst>
-          </p:cNvPr>
-          <p:cNvSpPr>
-            <a:spLocks noGrp="1"/>
-          </p:cNvSpPr>
-          <p:nvPr>
-            <p:ph type="sldNum" sz="quarter" idx="12"/>
-          </p:nvPr>
-        </p:nvSpPr>
-        <p:spPr>
-          <a:xfrm>
-            <a:off x="11027121" y="6399343"/>
-            <a:ext cx="753545" cy="365125"/>
-          </a:xfrm>
-        </p:spPr>
-        <p:txBody>
-          <a:bodyPr/>
-          <a:lstStyle/>
-          <a:p>
-            <a:fld id="{B436B6B1-DD6A-46C0-8E67-7AD950CB5C42}" type="slidenum">
-              <a:rPr lang="fr-FR" smtClean="0"/>
-              <a:t>5</a:t>
-            </a:fld>
-            <a:r>
-              <a:rPr lang="fr-FR" dirty="0"/>
-              <a:t>/9</a:t>
-            </a:r>
-          </a:p>
-        </p:txBody>
-      </p:sp>
     </p:spTree>
     <p:extLst>
       <p:ext uri="{BB962C8B-B14F-4D97-AF65-F5344CB8AC3E}">
-        <p14:creationId xmlns:p14="http://schemas.microsoft.com/office/powerpoint/2010/main" val="2986432335"/>
+        <p14:creationId xmlns:p14="http://schemas.microsoft.com/office/powerpoint/2010/main" val="2041237780"/>
       </p:ext>
     </p:extLst>
   </p:cSld>
@@ -8064,7 +7971,7 @@
           <p:cNvPr id="2" name="Titre 1">
             <a:extLst>
               <a:ext uri="{FF2B5EF4-FFF2-40B4-BE49-F238E27FC236}">
-                <a16:creationId xmlns:a16="http://schemas.microsoft.com/office/drawing/2014/main" id="{812BAED6-C8FC-4EB1-9BB6-4FE90542B7E5}"/>
+                <a16:creationId xmlns:a16="http://schemas.microsoft.com/office/drawing/2014/main" id="{43DD0991-2FC0-4D1E-80CF-E17B3AE90DB6}"/>
               </a:ext>
             </a:extLst>
           </p:cNvPr>
@@ -8075,7 +7982,12 @@
             <p:ph type="title"/>
           </p:nvPr>
         </p:nvSpPr>
-        <p:spPr/>
+        <p:spPr>
+          <a:xfrm>
+            <a:off x="913795" y="609600"/>
+            <a:ext cx="10353762" cy="820834"/>
+          </a:xfrm>
+        </p:spPr>
         <p:txBody>
           <a:bodyPr/>
           <a:lstStyle/>
@@ -8087,47 +7999,46 @@
           </a:p>
         </p:txBody>
       </p:sp>
-      <p:sp>
-        <p:nvSpPr>
-          <p:cNvPr id="3" name="Espace réservé du contenu 2">
+      <p:pic>
+        <p:nvPicPr>
+          <p:cNvPr id="4" name="Image 3">
             <a:extLst>
               <a:ext uri="{FF2B5EF4-FFF2-40B4-BE49-F238E27FC236}">
-                <a16:creationId xmlns:a16="http://schemas.microsoft.com/office/drawing/2014/main" id="{37C1228E-4E03-4216-8593-42EA6405CBF3}"/>
+                <a16:creationId xmlns:a16="http://schemas.microsoft.com/office/drawing/2014/main" id="{C01CA5F1-2AA6-4A9C-88AB-4062CE7D2C93}"/>
               </a:ext>
             </a:extLst>
           </p:cNvPr>
-          <p:cNvSpPr>
-            <a:spLocks noGrp="1"/>
-          </p:cNvSpPr>
-          <p:nvPr>
-            <p:ph idx="1"/>
-          </p:nvPr>
-        </p:nvSpPr>
-        <p:spPr/>
-        <p:txBody>
-          <a:bodyPr/>
-          <a:lstStyle/>
-          <a:p>
-            <a:pPr marL="36900" indent="0">
-              <a:buNone/>
-            </a:pPr>
-            <a:r>
-              <a:rPr lang="fr-FR" dirty="0"/>
-              <a:t>						</a:t>
-            </a:r>
-            <a:r>
-              <a:rPr lang="fr-FR" b="1" dirty="0"/>
-              <a:t>		  Autres résultats obtenus</a:t>
-            </a:r>
-          </a:p>
-        </p:txBody>
-      </p:sp>
+          <p:cNvPicPr/>
+          <p:nvPr/>
+        </p:nvPicPr>
+        <p:blipFill>
+          <a:blip r:embed="rId2" cstate="print">
+            <a:extLst>
+              <a:ext uri="{28A0092B-C50C-407E-A947-70E740481C1C}">
+                <a14:useLocalDpi xmlns:a14="http://schemas.microsoft.com/office/drawing/2010/main" val="0"/>
+              </a:ext>
+            </a:extLst>
+          </a:blip>
+          <a:stretch>
+            <a:fillRect/>
+          </a:stretch>
+        </p:blipFill>
+        <p:spPr>
+          <a:xfrm>
+            <a:off x="845536" y="3150541"/>
+            <a:ext cx="2924845" cy="2121454"/>
+          </a:xfrm>
+          <a:prstGeom prst="rect">
+            <a:avLst/>
+          </a:prstGeom>
+        </p:spPr>
+      </p:pic>
       <p:pic>
         <p:nvPicPr>
           <p:cNvPr id="5" name="Image 4">
             <a:extLst>
               <a:ext uri="{FF2B5EF4-FFF2-40B4-BE49-F238E27FC236}">
-                <a16:creationId xmlns:a16="http://schemas.microsoft.com/office/drawing/2014/main" id="{758BFE63-1101-41BE-88A2-4BAF1104C516}"/>
+                <a16:creationId xmlns:a16="http://schemas.microsoft.com/office/drawing/2014/main" id="{3C7A9D5E-7FC5-4E07-8561-2864D2DEBCFE}"/>
               </a:ext>
             </a:extLst>
           </p:cNvPr>
@@ -8135,20 +8046,20 @@
           <p:nvPr/>
         </p:nvPicPr>
         <p:blipFill rotWithShape="1">
-          <a:blip r:embed="rId2" cstate="print">
+          <a:blip r:embed="rId3">
             <a:extLst>
               <a:ext uri="{28A0092B-C50C-407E-A947-70E740481C1C}">
                 <a14:useLocalDpi xmlns:a14="http://schemas.microsoft.com/office/drawing/2010/main" val="0"/>
               </a:ext>
             </a:extLst>
           </a:blip>
-          <a:srcRect l="15838" t="9122" r="20831" b="10796"/>
+          <a:srcRect l="3486" t="3876" r="1917" b="3489"/>
           <a:stretch/>
         </p:blipFill>
         <p:spPr bwMode="auto">
           <a:xfrm>
-            <a:off x="1832227" y="2244643"/>
-            <a:ext cx="1711361" cy="2070195"/>
+            <a:off x="4310929" y="3150541"/>
+            <a:ext cx="3132178" cy="2121444"/>
           </a:xfrm>
           <a:prstGeom prst="rect">
             <a:avLst/>
@@ -8165,92 +8076,10 @@
       </p:pic>
       <p:pic>
         <p:nvPicPr>
-          <p:cNvPr id="6" name="Image 5">
+          <p:cNvPr id="7" name="Image 6">
             <a:extLst>
               <a:ext uri="{FF2B5EF4-FFF2-40B4-BE49-F238E27FC236}">
-                <a16:creationId xmlns:a16="http://schemas.microsoft.com/office/drawing/2014/main" id="{A7117B76-2FA1-4B21-9924-14A30BC813B4}"/>
-              </a:ext>
-            </a:extLst>
-          </p:cNvPr>
-          <p:cNvPicPr/>
-          <p:nvPr/>
-        </p:nvPicPr>
-        <p:blipFill rotWithShape="1">
-          <a:blip r:embed="rId3" cstate="print">
-            <a:extLst>
-              <a:ext uri="{28A0092B-C50C-407E-A947-70E740481C1C}">
-                <a14:useLocalDpi xmlns:a14="http://schemas.microsoft.com/office/drawing/2010/main" val="0"/>
-              </a:ext>
-            </a:extLst>
-          </a:blip>
-          <a:srcRect l="17776" t="7771" r="16631" b="11144"/>
-          <a:stretch/>
-        </p:blipFill>
-        <p:spPr bwMode="auto">
-          <a:xfrm>
-            <a:off x="5215577" y="2248655"/>
-            <a:ext cx="1750198" cy="2070194"/>
-          </a:xfrm>
-          <a:prstGeom prst="rect">
-            <a:avLst/>
-          </a:prstGeom>
-          <a:ln>
-            <a:noFill/>
-          </a:ln>
-          <a:extLst>
-            <a:ext uri="{53640926-AAD7-44D8-BBD7-CCE9431645EC}">
-              <a14:shadowObscured xmlns:a14="http://schemas.microsoft.com/office/drawing/2010/main"/>
-            </a:ext>
-          </a:extLst>
-        </p:spPr>
-      </p:pic>
-      <p:pic>
-        <p:nvPicPr>
-          <p:cNvPr id="7" name="Image 6">
-            <a:extLst>
-              <a:ext uri="{FF2B5EF4-FFF2-40B4-BE49-F238E27FC236}">
-                <a16:creationId xmlns:a16="http://schemas.microsoft.com/office/drawing/2014/main" id="{C44B4056-E38F-4509-A5AB-CC6ED2C22F31}"/>
-              </a:ext>
-            </a:extLst>
-          </p:cNvPr>
-          <p:cNvPicPr/>
-          <p:nvPr/>
-        </p:nvPicPr>
-        <p:blipFill rotWithShape="1">
-          <a:blip r:embed="rId4" cstate="print">
-            <a:extLst>
-              <a:ext uri="{28A0092B-C50C-407E-A947-70E740481C1C}">
-                <a14:useLocalDpi xmlns:a14="http://schemas.microsoft.com/office/drawing/2010/main" val="0"/>
-              </a:ext>
-            </a:extLst>
-          </a:blip>
-          <a:srcRect l="17131" t="7095" r="18893" b="11797"/>
-          <a:stretch/>
-        </p:blipFill>
-        <p:spPr bwMode="auto">
-          <a:xfrm>
-            <a:off x="8691730" y="2248654"/>
-            <a:ext cx="1706880" cy="2070195"/>
-          </a:xfrm>
-          <a:prstGeom prst="rect">
-            <a:avLst/>
-          </a:prstGeom>
-          <a:ln>
-            <a:noFill/>
-          </a:ln>
-          <a:extLst>
-            <a:ext uri="{53640926-AAD7-44D8-BBD7-CCE9431645EC}">
-              <a14:shadowObscured xmlns:a14="http://schemas.microsoft.com/office/drawing/2010/main"/>
-            </a:ext>
-          </a:extLst>
-        </p:spPr>
-      </p:pic>
-      <p:pic>
-        <p:nvPicPr>
-          <p:cNvPr id="8" name="Image 7">
-            <a:extLst>
-              <a:ext uri="{FF2B5EF4-FFF2-40B4-BE49-F238E27FC236}">
-                <a16:creationId xmlns:a16="http://schemas.microsoft.com/office/drawing/2014/main" id="{C89415CB-A76A-4FF3-BC6C-098CF57EADDE}"/>
+                <a16:creationId xmlns:a16="http://schemas.microsoft.com/office/drawing/2014/main" id="{8C608961-6B02-48E8-B22F-71D7BA5AC792}"/>
               </a:ext>
             </a:extLst>
           </p:cNvPr>
@@ -8258,7 +8087,7 @@
           <p:nvPr/>
         </p:nvPicPr>
         <p:blipFill>
-          <a:blip r:embed="rId5">
+          <a:blip r:embed="rId4" cstate="print">
             <a:extLst>
               <a:ext uri="{28A0092B-C50C-407E-A947-70E740481C1C}">
                 <a14:useLocalDpi xmlns:a14="http://schemas.microsoft.com/office/drawing/2010/main" val="0"/>
@@ -8271,88 +8100,286 @@
         </p:blipFill>
         <p:spPr>
           <a:xfrm>
-            <a:off x="1836708" y="4523872"/>
-            <a:ext cx="1706880" cy="1689735"/>
+            <a:off x="8266588" y="4185787"/>
+            <a:ext cx="2930713" cy="2126489"/>
           </a:xfrm>
           <a:prstGeom prst="rect">
             <a:avLst/>
           </a:prstGeom>
         </p:spPr>
       </p:pic>
-      <p:pic>
-        <p:nvPicPr>
-          <p:cNvPr id="9" name="Image 8">
+      <p:sp>
+        <p:nvSpPr>
+          <p:cNvPr id="8" name="Rectangle 7">
             <a:extLst>
               <a:ext uri="{FF2B5EF4-FFF2-40B4-BE49-F238E27FC236}">
-                <a16:creationId xmlns:a16="http://schemas.microsoft.com/office/drawing/2014/main" id="{332FE582-65B1-4C3C-860A-B525825B97D8}"/>
+                <a16:creationId xmlns:a16="http://schemas.microsoft.com/office/drawing/2014/main" id="{8A7F89A8-E86A-40E2-9C84-A3A90959970C}"/>
               </a:ext>
             </a:extLst>
           </p:cNvPr>
-          <p:cNvPicPr/>
+          <p:cNvSpPr/>
           <p:nvPr/>
-        </p:nvPicPr>
-        <p:blipFill>
-          <a:blip r:embed="rId6">
-            <a:extLst>
-              <a:ext uri="{28A0092B-C50C-407E-A947-70E740481C1C}">
-                <a14:useLocalDpi xmlns:a14="http://schemas.microsoft.com/office/drawing/2010/main" val="0"/>
-              </a:ext>
-            </a:extLst>
-          </a:blip>
-          <a:stretch>
-            <a:fillRect/>
-          </a:stretch>
-        </p:blipFill>
-        <p:spPr>
-          <a:xfrm>
-            <a:off x="5211385" y="4523873"/>
-            <a:ext cx="1706880" cy="1689735"/>
+        </p:nvSpPr>
+        <p:spPr>
+          <a:xfrm>
+            <a:off x="692458" y="1367921"/>
+            <a:ext cx="10963922" cy="5104646"/>
           </a:xfrm>
           <a:prstGeom prst="rect">
             <a:avLst/>
           </a:prstGeom>
-        </p:spPr>
-      </p:pic>
-      <p:pic>
-        <p:nvPicPr>
-          <p:cNvPr id="10" name="Image 9">
+          <a:noFill/>
+        </p:spPr>
+        <p:style>
+          <a:lnRef idx="2">
+            <a:schemeClr val="accent1">
+              <a:shade val="50000"/>
+            </a:schemeClr>
+          </a:lnRef>
+          <a:fillRef idx="1">
+            <a:schemeClr val="accent1"/>
+          </a:fillRef>
+          <a:effectRef idx="0">
+            <a:schemeClr val="accent1"/>
+          </a:effectRef>
+          <a:fontRef idx="minor">
+            <a:schemeClr val="lt1"/>
+          </a:fontRef>
+        </p:style>
+        <p:txBody>
+          <a:bodyPr rtlCol="0" anchor="ctr"/>
+          <a:lstStyle/>
+          <a:p>
+            <a:pPr algn="ctr"/>
+            <a:endParaRPr lang="fr-FR"/>
+          </a:p>
+        </p:txBody>
+      </p:sp>
+      <p:cxnSp>
+        <p:nvCxnSpPr>
+          <p:cNvPr id="10" name="Connecteur droit 9">
             <a:extLst>
               <a:ext uri="{FF2B5EF4-FFF2-40B4-BE49-F238E27FC236}">
-                <a16:creationId xmlns:a16="http://schemas.microsoft.com/office/drawing/2014/main" id="{327CA3C0-8964-4FE9-B2DB-5A792DFC3396}"/>
+                <a16:creationId xmlns:a16="http://schemas.microsoft.com/office/drawing/2014/main" id="{4162DFC5-F52D-4813-9B70-4337A4C02091}"/>
               </a:ext>
             </a:extLst>
           </p:cNvPr>
-          <p:cNvPicPr/>
+          <p:cNvCxnSpPr>
+            <a:cxnSpLocks/>
+          </p:cNvCxnSpPr>
           <p:nvPr/>
-        </p:nvPicPr>
-        <p:blipFill>
-          <a:blip r:embed="rId7">
-            <a:extLst>
-              <a:ext uri="{28A0092B-C50C-407E-A947-70E740481C1C}">
-                <a14:useLocalDpi xmlns:a14="http://schemas.microsoft.com/office/drawing/2010/main" val="0"/>
-              </a:ext>
-            </a:extLst>
-          </a:blip>
-          <a:stretch>
-            <a:fillRect/>
-          </a:stretch>
-        </p:blipFill>
-        <p:spPr>
-          <a:xfrm>
-            <a:off x="8691730" y="4523871"/>
-            <a:ext cx="1706880" cy="1689735"/>
+        </p:nvCxnSpPr>
+        <p:spPr>
+          <a:xfrm>
+            <a:off x="3950564" y="1367920"/>
+            <a:ext cx="0" cy="5104646"/>
+          </a:xfrm>
+          <a:prstGeom prst="line">
+            <a:avLst/>
+          </a:prstGeom>
+        </p:spPr>
+        <p:style>
+          <a:lnRef idx="1">
+            <a:schemeClr val="accent1"/>
+          </a:lnRef>
+          <a:fillRef idx="0">
+            <a:schemeClr val="accent1"/>
+          </a:fillRef>
+          <a:effectRef idx="0">
+            <a:schemeClr val="accent1"/>
+          </a:effectRef>
+          <a:fontRef idx="minor">
+            <a:schemeClr val="tx1"/>
+          </a:fontRef>
+        </p:style>
+      </p:cxnSp>
+      <p:cxnSp>
+        <p:nvCxnSpPr>
+          <p:cNvPr id="12" name="Connecteur droit 11">
+            <a:extLst>
+              <a:ext uri="{FF2B5EF4-FFF2-40B4-BE49-F238E27FC236}">
+                <a16:creationId xmlns:a16="http://schemas.microsoft.com/office/drawing/2014/main" id="{A8E9B3F2-4ED7-4B01-A997-88180F97387F}"/>
+              </a:ext>
+            </a:extLst>
+          </p:cNvPr>
+          <p:cNvCxnSpPr>
+            <a:cxnSpLocks/>
+          </p:cNvCxnSpPr>
+          <p:nvPr/>
+        </p:nvCxnSpPr>
+        <p:spPr>
+          <a:xfrm flipH="1">
+            <a:off x="692459" y="1920020"/>
+            <a:ext cx="10963921" cy="0"/>
+          </a:xfrm>
+          <a:prstGeom prst="line">
+            <a:avLst/>
+          </a:prstGeom>
+        </p:spPr>
+        <p:style>
+          <a:lnRef idx="1">
+            <a:schemeClr val="accent1"/>
+          </a:lnRef>
+          <a:fillRef idx="0">
+            <a:schemeClr val="accent1"/>
+          </a:fillRef>
+          <a:effectRef idx="0">
+            <a:schemeClr val="accent1"/>
+          </a:effectRef>
+          <a:fontRef idx="minor">
+            <a:schemeClr val="tx1"/>
+          </a:fontRef>
+        </p:style>
+      </p:cxnSp>
+      <p:sp>
+        <p:nvSpPr>
+          <p:cNvPr id="17" name="ZoneTexte 16">
+            <a:extLst>
+              <a:ext uri="{FF2B5EF4-FFF2-40B4-BE49-F238E27FC236}">
+                <a16:creationId xmlns:a16="http://schemas.microsoft.com/office/drawing/2014/main" id="{4F046821-D645-4208-9BE4-3784CCD67EBD}"/>
+              </a:ext>
+            </a:extLst>
+          </p:cNvPr>
+          <p:cNvSpPr txBox="1"/>
+          <p:nvPr/>
+        </p:nvSpPr>
+        <p:spPr>
+          <a:xfrm>
+            <a:off x="1950925" y="1462084"/>
+            <a:ext cx="714066" cy="369332"/>
           </a:xfrm>
           <a:prstGeom prst="rect">
             <a:avLst/>
           </a:prstGeom>
-        </p:spPr>
-      </p:pic>
+          <a:noFill/>
+        </p:spPr>
+        <p:txBody>
+          <a:bodyPr wrap="square" rtlCol="0">
+            <a:spAutoFit/>
+          </a:bodyPr>
+          <a:lstStyle/>
+          <a:p>
+            <a:r>
+              <a:rPr lang="fr-FR" dirty="0"/>
+              <a:t>Input</a:t>
+            </a:r>
+          </a:p>
+        </p:txBody>
+      </p:sp>
+      <p:sp>
+        <p:nvSpPr>
+          <p:cNvPr id="18" name="ZoneTexte 17">
+            <a:extLst>
+              <a:ext uri="{FF2B5EF4-FFF2-40B4-BE49-F238E27FC236}">
+                <a16:creationId xmlns:a16="http://schemas.microsoft.com/office/drawing/2014/main" id="{DEF26022-4D7B-4BB7-B147-0B621CC29FCF}"/>
+              </a:ext>
+            </a:extLst>
+          </p:cNvPr>
+          <p:cNvSpPr txBox="1"/>
+          <p:nvPr/>
+        </p:nvSpPr>
+        <p:spPr>
+          <a:xfrm>
+            <a:off x="4687397" y="1459305"/>
+            <a:ext cx="2379241" cy="369332"/>
+          </a:xfrm>
+          <a:prstGeom prst="rect">
+            <a:avLst/>
+          </a:prstGeom>
+          <a:noFill/>
+        </p:spPr>
+        <p:txBody>
+          <a:bodyPr wrap="square" rtlCol="0">
+            <a:spAutoFit/>
+          </a:bodyPr>
+          <a:lstStyle/>
+          <a:p>
+            <a:r>
+              <a:rPr lang="fr-FR" dirty="0"/>
+              <a:t>Résultats dans l’article</a:t>
+            </a:r>
+          </a:p>
+        </p:txBody>
+      </p:sp>
+      <p:sp>
+        <p:nvSpPr>
+          <p:cNvPr id="19" name="ZoneTexte 18">
+            <a:extLst>
+              <a:ext uri="{FF2B5EF4-FFF2-40B4-BE49-F238E27FC236}">
+                <a16:creationId xmlns:a16="http://schemas.microsoft.com/office/drawing/2014/main" id="{85F3571F-EE74-4F65-8687-23E4CE9E61A6}"/>
+              </a:ext>
+            </a:extLst>
+          </p:cNvPr>
+          <p:cNvSpPr txBox="1"/>
+          <p:nvPr/>
+        </p:nvSpPr>
+        <p:spPr>
+          <a:xfrm>
+            <a:off x="9005208" y="1453049"/>
+            <a:ext cx="1449436" cy="369332"/>
+          </a:xfrm>
+          <a:prstGeom prst="rect">
+            <a:avLst/>
+          </a:prstGeom>
+          <a:noFill/>
+        </p:spPr>
+        <p:txBody>
+          <a:bodyPr wrap="square" rtlCol="0">
+            <a:spAutoFit/>
+          </a:bodyPr>
+          <a:lstStyle/>
+          <a:p>
+            <a:r>
+              <a:rPr lang="fr-FR" dirty="0"/>
+              <a:t>Nos résultats</a:t>
+            </a:r>
+          </a:p>
+        </p:txBody>
+      </p:sp>
+      <p:cxnSp>
+        <p:nvCxnSpPr>
+          <p:cNvPr id="20" name="Connecteur droit 19">
+            <a:extLst>
+              <a:ext uri="{FF2B5EF4-FFF2-40B4-BE49-F238E27FC236}">
+                <a16:creationId xmlns:a16="http://schemas.microsoft.com/office/drawing/2014/main" id="{BB2C05A3-B939-4919-B45E-EE7E95C3F6E8}"/>
+              </a:ext>
+            </a:extLst>
+          </p:cNvPr>
+          <p:cNvCxnSpPr>
+            <a:cxnSpLocks/>
+          </p:cNvCxnSpPr>
+          <p:nvPr/>
+        </p:nvCxnSpPr>
+        <p:spPr>
+          <a:xfrm>
+            <a:off x="7803472" y="1351280"/>
+            <a:ext cx="1" cy="5104646"/>
+          </a:xfrm>
+          <a:prstGeom prst="line">
+            <a:avLst/>
+          </a:prstGeom>
+        </p:spPr>
+        <p:style>
+          <a:lnRef idx="1">
+            <a:schemeClr val="accent1"/>
+          </a:lnRef>
+          <a:fillRef idx="0">
+            <a:schemeClr val="accent1"/>
+          </a:fillRef>
+          <a:effectRef idx="0">
+            <a:schemeClr val="accent1"/>
+          </a:effectRef>
+          <a:fontRef idx="minor">
+            <a:schemeClr val="tx1"/>
+          </a:fontRef>
+        </p:style>
+      </p:cxnSp>
       <p:pic>
         <p:nvPicPr>
-          <p:cNvPr id="11" name="Image 10">
+          <p:cNvPr id="26" name="Image 25">
             <a:extLst>
               <a:ext uri="{FF2B5EF4-FFF2-40B4-BE49-F238E27FC236}">
-                <a16:creationId xmlns:a16="http://schemas.microsoft.com/office/drawing/2014/main" id="{7648F2A1-0F8C-43B2-A6D5-04FB1AA2CDCD}"/>
+                <a16:creationId xmlns:a16="http://schemas.microsoft.com/office/drawing/2014/main" id="{AE8CA53B-CB54-465D-947A-86001DD8B11B}"/>
               </a:ext>
             </a:extLst>
           </p:cNvPr>
@@ -8362,7 +8389,36 @@
           <p:nvPr/>
         </p:nvPicPr>
         <p:blipFill rotWithShape="1">
-          <a:blip r:embed="rId8">
+          <a:blip r:embed="rId5"/>
+          <a:srcRect t="3733"/>
+          <a:stretch/>
+        </p:blipFill>
+        <p:spPr>
+          <a:xfrm>
+            <a:off x="8262552" y="2029360"/>
+            <a:ext cx="2934749" cy="2047088"/>
+          </a:xfrm>
+          <a:prstGeom prst="rect">
+            <a:avLst/>
+          </a:prstGeom>
+        </p:spPr>
+      </p:pic>
+      <p:pic>
+        <p:nvPicPr>
+          <p:cNvPr id="14" name="Image 13">
+            <a:extLst>
+              <a:ext uri="{FF2B5EF4-FFF2-40B4-BE49-F238E27FC236}">
+                <a16:creationId xmlns:a16="http://schemas.microsoft.com/office/drawing/2014/main" id="{698695CF-25A5-4142-910D-372FDCDAB148}"/>
+              </a:ext>
+            </a:extLst>
+          </p:cNvPr>
+          <p:cNvPicPr>
+            <a:picLocks noChangeAspect="1"/>
+          </p:cNvPicPr>
+          <p:nvPr/>
+        </p:nvPicPr>
+        <p:blipFill rotWithShape="1">
+          <a:blip r:embed="rId6">
             <a:extLst>
               <a:ext uri="{28A0092B-C50C-407E-A947-70E740481C1C}">
                 <a14:useLocalDpi xmlns:a14="http://schemas.microsoft.com/office/drawing/2010/main" val="0"/>
@@ -8384,10 +8440,10 @@
       </p:pic>
       <p:pic>
         <p:nvPicPr>
-          <p:cNvPr id="13" name="Image 12">
+          <p:cNvPr id="16" name="Image 15">
             <a:extLst>
               <a:ext uri="{FF2B5EF4-FFF2-40B4-BE49-F238E27FC236}">
-                <a16:creationId xmlns:a16="http://schemas.microsoft.com/office/drawing/2014/main" id="{87D42978-8B6B-4EE6-A560-83B6175452DF}"/>
+                <a16:creationId xmlns:a16="http://schemas.microsoft.com/office/drawing/2014/main" id="{DAC8FB30-64BB-45CC-9E00-960912287D32}"/>
               </a:ext>
             </a:extLst>
           </p:cNvPr>
@@ -8397,7 +8453,7 @@
           <p:nvPr/>
         </p:nvPicPr>
         <p:blipFill>
-          <a:blip r:embed="rId9">
+          <a:blip r:embed="rId7">
             <a:extLst>
               <a:ext uri="{28A0092B-C50C-407E-A947-70E740481C1C}">
                 <a14:useLocalDpi xmlns:a14="http://schemas.microsoft.com/office/drawing/2010/main" val="0"/>
@@ -8419,10 +8475,10 @@
       </p:pic>
       <p:sp>
         <p:nvSpPr>
-          <p:cNvPr id="4" name="Espace réservé du numéro de diapositive 3">
+          <p:cNvPr id="3" name="Espace réservé du numéro de diapositive 2">
             <a:extLst>
               <a:ext uri="{FF2B5EF4-FFF2-40B4-BE49-F238E27FC236}">
-                <a16:creationId xmlns:a16="http://schemas.microsoft.com/office/drawing/2014/main" id="{22AB77F3-86F2-496C-A54B-052437A4B3FA}"/>
+                <a16:creationId xmlns:a16="http://schemas.microsoft.com/office/drawing/2014/main" id="{9AEF0DBC-8410-40C6-8067-F80F8B9EEB42}"/>
               </a:ext>
             </a:extLst>
           </p:cNvPr>
@@ -8433,7 +8489,12 @@
             <p:ph type="sldNum" sz="quarter" idx="12"/>
           </p:nvPr>
         </p:nvSpPr>
-        <p:spPr/>
+        <p:spPr>
+          <a:xfrm>
+            <a:off x="11027121" y="6399343"/>
+            <a:ext cx="753545" cy="365125"/>
+          </a:xfrm>
+        </p:spPr>
         <p:txBody>
           <a:bodyPr/>
           <a:lstStyle/>
@@ -8452,7 +8513,7 @@
     </p:spTree>
     <p:extLst>
       <p:ext uri="{BB962C8B-B14F-4D97-AF65-F5344CB8AC3E}">
-        <p14:creationId xmlns:p14="http://schemas.microsoft.com/office/powerpoint/2010/main" val="15643655"/>
+        <p14:creationId xmlns:p14="http://schemas.microsoft.com/office/powerpoint/2010/main" val="2986432335"/>
       </p:ext>
     </p:extLst>
   </p:cSld>
@@ -8484,7 +8545,7 @@
           <p:cNvPr id="2" name="Titre 1">
             <a:extLst>
               <a:ext uri="{FF2B5EF4-FFF2-40B4-BE49-F238E27FC236}">
-                <a16:creationId xmlns:a16="http://schemas.microsoft.com/office/drawing/2014/main" id="{6A0FAF66-9E65-4DE0-A709-B8FE9B600A7A}"/>
+                <a16:creationId xmlns:a16="http://schemas.microsoft.com/office/drawing/2014/main" id="{812BAED6-C8FC-4EB1-9BB6-4FE90542B7E5}"/>
               </a:ext>
             </a:extLst>
           </p:cNvPr>
@@ -8502,7 +8563,7 @@
           <a:p>
             <a:r>
               <a:rPr lang="fr-FR" dirty="0"/>
-              <a:t>Pistes à explorer</a:t>
+              <a:t>Nos résultats</a:t>
             </a:r>
           </a:p>
         </p:txBody>
@@ -8512,7 +8573,7 @@
           <p:cNvPr id="3" name="Espace réservé du contenu 2">
             <a:extLst>
               <a:ext uri="{FF2B5EF4-FFF2-40B4-BE49-F238E27FC236}">
-                <a16:creationId xmlns:a16="http://schemas.microsoft.com/office/drawing/2014/main" id="{E70BB804-0D0B-4730-90E8-74D0715718C4}"/>
+                <a16:creationId xmlns:a16="http://schemas.microsoft.com/office/drawing/2014/main" id="{37C1228E-4E03-4216-8593-42EA6405CBF3}"/>
               </a:ext>
             </a:extLst>
           </p:cNvPr>
@@ -8523,67 +8584,31 @@
             <p:ph idx="1"/>
           </p:nvPr>
         </p:nvSpPr>
-        <p:spPr>
-          <a:xfrm>
-            <a:off x="913794" y="1732449"/>
-            <a:ext cx="7040597" cy="4650596"/>
-          </a:xfrm>
-        </p:spPr>
-        <p:txBody>
-          <a:bodyPr>
-            <a:normAutofit lnSpcReduction="10000"/>
-          </a:bodyPr>
+        <p:spPr/>
+        <p:txBody>
+          <a:bodyPr/>
           <a:lstStyle/>
           <a:p>
+            <a:pPr marL="36900" indent="0">
+              <a:buNone/>
+            </a:pPr>
             <a:r>
               <a:rPr lang="fr-FR" dirty="0"/>
-              <a:t>Se débarrasser des artefacts</a:t>
-            </a:r>
-          </a:p>
-          <a:p>
-            <a:endParaRPr lang="fr-FR" dirty="0"/>
-          </a:p>
-          <a:p>
-            <a:endParaRPr lang="fr-FR" dirty="0"/>
-          </a:p>
-          <a:p>
-            <a:endParaRPr lang="fr-FR" dirty="0"/>
-          </a:p>
-          <a:p>
-            <a:endParaRPr lang="fr-FR" dirty="0"/>
-          </a:p>
-          <a:p>
-            <a:r>
-              <a:rPr lang="fr-FR" dirty="0"/>
-              <a:t>Améliorer la détection/ suivi du contour</a:t>
-            </a:r>
-          </a:p>
-          <a:p>
-            <a:endParaRPr lang="fr-FR" dirty="0"/>
-          </a:p>
-          <a:p>
-            <a:endParaRPr lang="fr-FR" dirty="0"/>
-          </a:p>
-          <a:p>
-            <a:endParaRPr lang="fr-FR" dirty="0"/>
-          </a:p>
-          <a:p>
-            <a:endParaRPr lang="fr-FR" dirty="0"/>
-          </a:p>
-          <a:p>
-            <a:r>
-              <a:rPr lang="fr-FR" dirty="0"/>
-              <a:t>Mettre au point un agent qui ferait de la détection de région</a:t>
+              <a:t>						</a:t>
+            </a:r>
+            <a:r>
+              <a:rPr lang="fr-FR" b="1" dirty="0"/>
+              <a:t>		  Autres résultats obtenus</a:t>
             </a:r>
           </a:p>
         </p:txBody>
       </p:sp>
       <p:pic>
         <p:nvPicPr>
-          <p:cNvPr id="6" name="Image 5">
+          <p:cNvPr id="5" name="Image 4">
             <a:extLst>
               <a:ext uri="{FF2B5EF4-FFF2-40B4-BE49-F238E27FC236}">
-                <a16:creationId xmlns:a16="http://schemas.microsoft.com/office/drawing/2014/main" id="{D06E0838-1C83-429F-B0EC-9309E81C3AD6}"/>
+                <a16:creationId xmlns:a16="http://schemas.microsoft.com/office/drawing/2014/main" id="{758BFE63-1101-41BE-88A2-4BAF1104C516}"/>
               </a:ext>
             </a:extLst>
           </p:cNvPr>
@@ -8591,14 +8616,20 @@
           <p:nvPr/>
         </p:nvPicPr>
         <p:blipFill rotWithShape="1">
-          <a:blip r:embed="rId2"/>
-          <a:srcRect l="19015" r="17824"/>
+          <a:blip r:embed="rId2" cstate="print">
+            <a:extLst>
+              <a:ext uri="{28A0092B-C50C-407E-A947-70E740481C1C}">
+                <a14:useLocalDpi xmlns:a14="http://schemas.microsoft.com/office/drawing/2010/main" val="0"/>
+              </a:ext>
+            </a:extLst>
+          </a:blip>
+          <a:srcRect l="15838" t="9122" r="20831" b="10796"/>
           <a:stretch/>
         </p:blipFill>
         <p:spPr bwMode="auto">
           <a:xfrm>
-            <a:off x="6426878" y="4043216"/>
-            <a:ext cx="2856599" cy="1170549"/>
+            <a:off x="1832227" y="2244643"/>
+            <a:ext cx="1711361" cy="2070195"/>
           </a:xfrm>
           <a:prstGeom prst="rect">
             <a:avLst/>
@@ -8615,10 +8646,92 @@
       </p:pic>
       <p:pic>
         <p:nvPicPr>
+          <p:cNvPr id="6" name="Image 5">
+            <a:extLst>
+              <a:ext uri="{FF2B5EF4-FFF2-40B4-BE49-F238E27FC236}">
+                <a16:creationId xmlns:a16="http://schemas.microsoft.com/office/drawing/2014/main" id="{A7117B76-2FA1-4B21-9924-14A30BC813B4}"/>
+              </a:ext>
+            </a:extLst>
+          </p:cNvPr>
+          <p:cNvPicPr/>
+          <p:nvPr/>
+        </p:nvPicPr>
+        <p:blipFill rotWithShape="1">
+          <a:blip r:embed="rId3" cstate="print">
+            <a:extLst>
+              <a:ext uri="{28A0092B-C50C-407E-A947-70E740481C1C}">
+                <a14:useLocalDpi xmlns:a14="http://schemas.microsoft.com/office/drawing/2010/main" val="0"/>
+              </a:ext>
+            </a:extLst>
+          </a:blip>
+          <a:srcRect l="17776" t="7771" r="16631" b="11144"/>
+          <a:stretch/>
+        </p:blipFill>
+        <p:spPr bwMode="auto">
+          <a:xfrm>
+            <a:off x="5215577" y="2248655"/>
+            <a:ext cx="1750198" cy="2070194"/>
+          </a:xfrm>
+          <a:prstGeom prst="rect">
+            <a:avLst/>
+          </a:prstGeom>
+          <a:ln>
+            <a:noFill/>
+          </a:ln>
+          <a:extLst>
+            <a:ext uri="{53640926-AAD7-44D8-BBD7-CCE9431645EC}">
+              <a14:shadowObscured xmlns:a14="http://schemas.microsoft.com/office/drawing/2010/main"/>
+            </a:ext>
+          </a:extLst>
+        </p:spPr>
+      </p:pic>
+      <p:pic>
+        <p:nvPicPr>
           <p:cNvPr id="7" name="Image 6">
             <a:extLst>
               <a:ext uri="{FF2B5EF4-FFF2-40B4-BE49-F238E27FC236}">
-                <a16:creationId xmlns:a16="http://schemas.microsoft.com/office/drawing/2014/main" id="{AB103E6D-D0D5-460E-8869-9C3E62C38815}"/>
+                <a16:creationId xmlns:a16="http://schemas.microsoft.com/office/drawing/2014/main" id="{C44B4056-E38F-4509-A5AB-CC6ED2C22F31}"/>
+              </a:ext>
+            </a:extLst>
+          </p:cNvPr>
+          <p:cNvPicPr/>
+          <p:nvPr/>
+        </p:nvPicPr>
+        <p:blipFill rotWithShape="1">
+          <a:blip r:embed="rId4" cstate="print">
+            <a:extLst>
+              <a:ext uri="{28A0092B-C50C-407E-A947-70E740481C1C}">
+                <a14:useLocalDpi xmlns:a14="http://schemas.microsoft.com/office/drawing/2010/main" val="0"/>
+              </a:ext>
+            </a:extLst>
+          </a:blip>
+          <a:srcRect l="17131" t="7095" r="18893" b="11797"/>
+          <a:stretch/>
+        </p:blipFill>
+        <p:spPr bwMode="auto">
+          <a:xfrm>
+            <a:off x="8691730" y="2248654"/>
+            <a:ext cx="1706880" cy="2070195"/>
+          </a:xfrm>
+          <a:prstGeom prst="rect">
+            <a:avLst/>
+          </a:prstGeom>
+          <a:ln>
+            <a:noFill/>
+          </a:ln>
+          <a:extLst>
+            <a:ext uri="{53640926-AAD7-44D8-BBD7-CCE9431645EC}">
+              <a14:shadowObscured xmlns:a14="http://schemas.microsoft.com/office/drawing/2010/main"/>
+            </a:ext>
+          </a:extLst>
+        </p:spPr>
+      </p:pic>
+      <p:pic>
+        <p:nvPicPr>
+          <p:cNvPr id="8" name="Image 7">
+            <a:extLst>
+              <a:ext uri="{FF2B5EF4-FFF2-40B4-BE49-F238E27FC236}">
+                <a16:creationId xmlns:a16="http://schemas.microsoft.com/office/drawing/2014/main" id="{C89415CB-A76A-4FF3-BC6C-098CF57EADDE}"/>
               </a:ext>
             </a:extLst>
           </p:cNvPr>
@@ -8626,7 +8739,7 @@
           <p:nvPr/>
         </p:nvPicPr>
         <p:blipFill>
-          <a:blip r:embed="rId3">
+          <a:blip r:embed="rId5">
             <a:extLst>
               <a:ext uri="{28A0092B-C50C-407E-A947-70E740481C1C}">
                 <a14:useLocalDpi xmlns:a14="http://schemas.microsoft.com/office/drawing/2010/main" val="0"/>
@@ -8639,8 +8752,8 @@
         </p:blipFill>
         <p:spPr>
           <a:xfrm>
-            <a:off x="6426878" y="1909617"/>
-            <a:ext cx="2019300" cy="1371600"/>
+            <a:off x="1836708" y="4523872"/>
+            <a:ext cx="1706880" cy="1689735"/>
           </a:xfrm>
           <a:prstGeom prst="rect">
             <a:avLst/>
@@ -8649,10 +8762,78 @@
       </p:pic>
       <p:pic>
         <p:nvPicPr>
-          <p:cNvPr id="8" name="Image 7">
+          <p:cNvPr id="9" name="Image 8">
             <a:extLst>
               <a:ext uri="{FF2B5EF4-FFF2-40B4-BE49-F238E27FC236}">
-                <a16:creationId xmlns:a16="http://schemas.microsoft.com/office/drawing/2014/main" id="{999B85D4-E676-4F3A-B1D2-4EADE45712CB}"/>
+                <a16:creationId xmlns:a16="http://schemas.microsoft.com/office/drawing/2014/main" id="{332FE582-65B1-4C3C-860A-B525825B97D8}"/>
+              </a:ext>
+            </a:extLst>
+          </p:cNvPr>
+          <p:cNvPicPr/>
+          <p:nvPr/>
+        </p:nvPicPr>
+        <p:blipFill>
+          <a:blip r:embed="rId6">
+            <a:extLst>
+              <a:ext uri="{28A0092B-C50C-407E-A947-70E740481C1C}">
+                <a14:useLocalDpi xmlns:a14="http://schemas.microsoft.com/office/drawing/2010/main" val="0"/>
+              </a:ext>
+            </a:extLst>
+          </a:blip>
+          <a:stretch>
+            <a:fillRect/>
+          </a:stretch>
+        </p:blipFill>
+        <p:spPr>
+          <a:xfrm>
+            <a:off x="5211385" y="4523873"/>
+            <a:ext cx="1706880" cy="1689735"/>
+          </a:xfrm>
+          <a:prstGeom prst="rect">
+            <a:avLst/>
+          </a:prstGeom>
+        </p:spPr>
+      </p:pic>
+      <p:pic>
+        <p:nvPicPr>
+          <p:cNvPr id="10" name="Image 9">
+            <a:extLst>
+              <a:ext uri="{FF2B5EF4-FFF2-40B4-BE49-F238E27FC236}">
+                <a16:creationId xmlns:a16="http://schemas.microsoft.com/office/drawing/2014/main" id="{327CA3C0-8964-4FE9-B2DB-5A792DFC3396}"/>
+              </a:ext>
+            </a:extLst>
+          </p:cNvPr>
+          <p:cNvPicPr/>
+          <p:nvPr/>
+        </p:nvPicPr>
+        <p:blipFill>
+          <a:blip r:embed="rId7">
+            <a:extLst>
+              <a:ext uri="{28A0092B-C50C-407E-A947-70E740481C1C}">
+                <a14:useLocalDpi xmlns:a14="http://schemas.microsoft.com/office/drawing/2010/main" val="0"/>
+              </a:ext>
+            </a:extLst>
+          </a:blip>
+          <a:stretch>
+            <a:fillRect/>
+          </a:stretch>
+        </p:blipFill>
+        <p:spPr>
+          <a:xfrm>
+            <a:off x="8691730" y="4523871"/>
+            <a:ext cx="1706880" cy="1689735"/>
+          </a:xfrm>
+          <a:prstGeom prst="rect">
+            <a:avLst/>
+          </a:prstGeom>
+        </p:spPr>
+      </p:pic>
+      <p:pic>
+        <p:nvPicPr>
+          <p:cNvPr id="11" name="Image 10">
+            <a:extLst>
+              <a:ext uri="{FF2B5EF4-FFF2-40B4-BE49-F238E27FC236}">
+                <a16:creationId xmlns:a16="http://schemas.microsoft.com/office/drawing/2014/main" id="{7648F2A1-0F8C-43B2-A6D5-04FB1AA2CDCD}"/>
               </a:ext>
             </a:extLst>
           </p:cNvPr>
@@ -8662,7 +8843,7 @@
           <p:nvPr/>
         </p:nvPicPr>
         <p:blipFill rotWithShape="1">
-          <a:blip r:embed="rId4">
+          <a:blip r:embed="rId8">
             <a:extLst>
               <a:ext uri="{28A0092B-C50C-407E-A947-70E740481C1C}">
                 <a14:useLocalDpi xmlns:a14="http://schemas.microsoft.com/office/drawing/2010/main" val="0"/>
@@ -8684,10 +8865,10 @@
       </p:pic>
       <p:pic>
         <p:nvPicPr>
-          <p:cNvPr id="10" name="Image 9">
+          <p:cNvPr id="13" name="Image 12">
             <a:extLst>
               <a:ext uri="{FF2B5EF4-FFF2-40B4-BE49-F238E27FC236}">
-                <a16:creationId xmlns:a16="http://schemas.microsoft.com/office/drawing/2014/main" id="{AB4966DB-0CC6-45B5-8C70-E6B853B529BE}"/>
+                <a16:creationId xmlns:a16="http://schemas.microsoft.com/office/drawing/2014/main" id="{87D42978-8B6B-4EE6-A560-83B6175452DF}"/>
               </a:ext>
             </a:extLst>
           </p:cNvPr>
@@ -8697,7 +8878,7 @@
           <p:nvPr/>
         </p:nvPicPr>
         <p:blipFill>
-          <a:blip r:embed="rId5">
+          <a:blip r:embed="rId9">
             <a:extLst>
               <a:ext uri="{28A0092B-C50C-407E-A947-70E740481C1C}">
                 <a14:useLocalDpi xmlns:a14="http://schemas.microsoft.com/office/drawing/2010/main" val="0"/>
@@ -8722,7 +8903,7 @@
           <p:cNvPr id="4" name="Espace réservé du numéro de diapositive 3">
             <a:extLst>
               <a:ext uri="{FF2B5EF4-FFF2-40B4-BE49-F238E27FC236}">
-                <a16:creationId xmlns:a16="http://schemas.microsoft.com/office/drawing/2014/main" id="{5EFC57C8-DEF7-418C-B6C3-453283024E80}"/>
+                <a16:creationId xmlns:a16="http://schemas.microsoft.com/office/drawing/2014/main" id="{22AB77F3-86F2-496C-A54B-052437A4B3FA}"/>
               </a:ext>
             </a:extLst>
           </p:cNvPr>
@@ -8752,7 +8933,7 @@
     </p:spTree>
     <p:extLst>
       <p:ext uri="{BB962C8B-B14F-4D97-AF65-F5344CB8AC3E}">
-        <p14:creationId xmlns:p14="http://schemas.microsoft.com/office/powerpoint/2010/main" val="189909671"/>
+        <p14:creationId xmlns:p14="http://schemas.microsoft.com/office/powerpoint/2010/main" val="15643655"/>
       </p:ext>
     </p:extLst>
   </p:cSld>
@@ -8784,7 +8965,7 @@
           <p:cNvPr id="2" name="Titre 1">
             <a:extLst>
               <a:ext uri="{FF2B5EF4-FFF2-40B4-BE49-F238E27FC236}">
-                <a16:creationId xmlns:a16="http://schemas.microsoft.com/office/drawing/2014/main" id="{E1D19F9F-E66D-4541-AF6D-CCA05F856FAA}"/>
+                <a16:creationId xmlns:a16="http://schemas.microsoft.com/office/drawing/2014/main" id="{6A0FAF66-9E65-4DE0-A709-B8FE9B600A7A}"/>
               </a:ext>
             </a:extLst>
           </p:cNvPr>
@@ -8802,7 +8983,7 @@
           <a:p>
             <a:r>
               <a:rPr lang="fr-FR" dirty="0"/>
-              <a:t>Travaux cités</a:t>
+              <a:t>Pistes à explorer</a:t>
             </a:r>
           </a:p>
         </p:txBody>
@@ -8812,7 +8993,7 @@
           <p:cNvPr id="3" name="Espace réservé du contenu 2">
             <a:extLst>
               <a:ext uri="{FF2B5EF4-FFF2-40B4-BE49-F238E27FC236}">
-                <a16:creationId xmlns:a16="http://schemas.microsoft.com/office/drawing/2014/main" id="{F6118C50-6835-43DD-A850-01AABC86E4D1}"/>
+                <a16:creationId xmlns:a16="http://schemas.microsoft.com/office/drawing/2014/main" id="{E70BB804-0D0B-4730-90E8-74D0715718C4}"/>
               </a:ext>
             </a:extLst>
           </p:cNvPr>
@@ -8823,99 +9004,136 @@
             <p:ph idx="1"/>
           </p:nvPr>
         </p:nvSpPr>
-        <p:spPr/>
-        <p:txBody>
-          <a:bodyPr/>
+        <p:spPr>
+          <a:xfrm>
+            <a:off x="913794" y="1732449"/>
+            <a:ext cx="7040597" cy="4650596"/>
+          </a:xfrm>
+        </p:spPr>
+        <p:txBody>
+          <a:bodyPr>
+            <a:normAutofit lnSpcReduction="10000"/>
+          </a:bodyPr>
           <a:lstStyle/>
           <a:p>
             <a:r>
               <a:rPr lang="fr-FR" dirty="0"/>
-              <a:t>Jason </a:t>
-            </a:r>
-            <a:r>
-              <a:rPr lang="fr-FR" dirty="0" err="1"/>
-              <a:t>Mahdjoub</a:t>
-            </a:r>
+              <a:t>Se débarrasser des artefacts</a:t>
+            </a:r>
+          </a:p>
+          <a:p>
+            <a:endParaRPr lang="fr-FR" dirty="0"/>
+          </a:p>
+          <a:p>
+            <a:endParaRPr lang="fr-FR" dirty="0"/>
+          </a:p>
+          <a:p>
+            <a:endParaRPr lang="fr-FR" dirty="0"/>
+          </a:p>
+          <a:p>
+            <a:endParaRPr lang="fr-FR" dirty="0"/>
+          </a:p>
+          <a:p>
             <a:r>
               <a:rPr lang="fr-FR" dirty="0"/>
-              <a:t>, Zahia </a:t>
-            </a:r>
-            <a:r>
-              <a:rPr lang="fr-FR" dirty="0" err="1"/>
-              <a:t>Guessoum</a:t>
-            </a:r>
+              <a:t>Améliorer la détection/ suivi du contour</a:t>
+            </a:r>
+          </a:p>
+          <a:p>
+            <a:endParaRPr lang="fr-FR" dirty="0"/>
+          </a:p>
+          <a:p>
+            <a:endParaRPr lang="fr-FR" dirty="0"/>
+          </a:p>
+          <a:p>
+            <a:endParaRPr lang="fr-FR" dirty="0"/>
+          </a:p>
+          <a:p>
+            <a:endParaRPr lang="fr-FR" dirty="0"/>
+          </a:p>
+          <a:p>
             <a:r>
               <a:rPr lang="fr-FR" dirty="0"/>
-              <a:t>, Fabien Michel, Michel Herbin. A multi-agent </a:t>
-            </a:r>
-            <a:r>
-              <a:rPr lang="fr-FR" dirty="0" err="1"/>
-              <a:t>approach</a:t>
-            </a:r>
-            <a:r>
-              <a:rPr lang="fr-FR" dirty="0"/>
-              <a:t> for the </a:t>
-            </a:r>
-            <a:r>
-              <a:rPr lang="fr-FR" dirty="0" err="1"/>
-              <a:t>edge</a:t>
-            </a:r>
-            <a:r>
-              <a:rPr lang="fr-FR" dirty="0"/>
-              <a:t> </a:t>
-            </a:r>
-            <a:r>
-              <a:rPr lang="fr-FR" dirty="0" err="1"/>
-              <a:t>detection</a:t>
-            </a:r>
-            <a:r>
-              <a:rPr lang="fr-FR" dirty="0"/>
-              <a:t> in image </a:t>
-            </a:r>
-            <a:r>
-              <a:rPr lang="fr-FR" dirty="0" err="1"/>
-              <a:t>processing</a:t>
-            </a:r>
-            <a:r>
-              <a:rPr lang="fr-FR" dirty="0"/>
-              <a:t>. 4th </a:t>
-            </a:r>
-            <a:r>
-              <a:rPr lang="fr-FR" dirty="0" err="1"/>
-              <a:t>European</a:t>
-            </a:r>
-            <a:r>
-              <a:rPr lang="fr-FR" dirty="0"/>
-              <a:t> Workshop on Multi-Agent </a:t>
-            </a:r>
-            <a:r>
-              <a:rPr lang="fr-FR" dirty="0" err="1"/>
-              <a:t>Systems</a:t>
-            </a:r>
-            <a:r>
-              <a:rPr lang="fr-FR" dirty="0"/>
-              <a:t> - EUMAS’06, </a:t>
-            </a:r>
-            <a:r>
-              <a:rPr lang="fr-FR" dirty="0" err="1"/>
-              <a:t>Dec</a:t>
-            </a:r>
-            <a:r>
-              <a:rPr lang="fr-FR" dirty="0"/>
-              <a:t> 2006, Lisbonne, Portugal. hal-02404201</a:t>
-            </a:r>
-          </a:p>
-          <a:p>
-            <a:endParaRPr lang="fr-FR" dirty="0"/>
+              <a:t>Mettre au point un agent qui ferait de la détection de région</a:t>
+            </a:r>
           </a:p>
         </p:txBody>
       </p:sp>
       <p:pic>
         <p:nvPicPr>
-          <p:cNvPr id="4" name="Image 3">
+          <p:cNvPr id="6" name="Image 5">
             <a:extLst>
               <a:ext uri="{FF2B5EF4-FFF2-40B4-BE49-F238E27FC236}">
-                <a16:creationId xmlns:a16="http://schemas.microsoft.com/office/drawing/2014/main" id="{B69D7D5D-5666-43BC-8720-EB29D12AA091}"/>
+                <a16:creationId xmlns:a16="http://schemas.microsoft.com/office/drawing/2014/main" id="{D06E0838-1C83-429F-B0EC-9309E81C3AD6}"/>
+              </a:ext>
+            </a:extLst>
+          </p:cNvPr>
+          <p:cNvPicPr/>
+          <p:nvPr/>
+        </p:nvPicPr>
+        <p:blipFill rotWithShape="1">
+          <a:blip r:embed="rId2"/>
+          <a:srcRect l="19015" r="17824"/>
+          <a:stretch/>
+        </p:blipFill>
+        <p:spPr bwMode="auto">
+          <a:xfrm>
+            <a:off x="6426878" y="4043216"/>
+            <a:ext cx="2856599" cy="1170549"/>
+          </a:xfrm>
+          <a:prstGeom prst="rect">
+            <a:avLst/>
+          </a:prstGeom>
+          <a:ln>
+            <a:noFill/>
+          </a:ln>
+          <a:extLst>
+            <a:ext uri="{53640926-AAD7-44D8-BBD7-CCE9431645EC}">
+              <a14:shadowObscured xmlns:a14="http://schemas.microsoft.com/office/drawing/2010/main"/>
+            </a:ext>
+          </a:extLst>
+        </p:spPr>
+      </p:pic>
+      <p:pic>
+        <p:nvPicPr>
+          <p:cNvPr id="7" name="Image 6">
+            <a:extLst>
+              <a:ext uri="{FF2B5EF4-FFF2-40B4-BE49-F238E27FC236}">
+                <a16:creationId xmlns:a16="http://schemas.microsoft.com/office/drawing/2014/main" id="{AB103E6D-D0D5-460E-8869-9C3E62C38815}"/>
+              </a:ext>
+            </a:extLst>
+          </p:cNvPr>
+          <p:cNvPicPr/>
+          <p:nvPr/>
+        </p:nvPicPr>
+        <p:blipFill>
+          <a:blip r:embed="rId3">
+            <a:extLst>
+              <a:ext uri="{28A0092B-C50C-407E-A947-70E740481C1C}">
+                <a14:useLocalDpi xmlns:a14="http://schemas.microsoft.com/office/drawing/2010/main" val="0"/>
+              </a:ext>
+            </a:extLst>
+          </a:blip>
+          <a:stretch>
+            <a:fillRect/>
+          </a:stretch>
+        </p:blipFill>
+        <p:spPr>
+          <a:xfrm>
+            <a:off x="6426878" y="1909617"/>
+            <a:ext cx="2019300" cy="1371600"/>
+          </a:xfrm>
+          <a:prstGeom prst="rect">
+            <a:avLst/>
+          </a:prstGeom>
+        </p:spPr>
+      </p:pic>
+      <p:pic>
+        <p:nvPicPr>
+          <p:cNvPr id="8" name="Image 7">
+            <a:extLst>
+              <a:ext uri="{FF2B5EF4-FFF2-40B4-BE49-F238E27FC236}">
+                <a16:creationId xmlns:a16="http://schemas.microsoft.com/office/drawing/2014/main" id="{999B85D4-E676-4F3A-B1D2-4EADE45712CB}"/>
               </a:ext>
             </a:extLst>
           </p:cNvPr>
@@ -8925,7 +9143,7 @@
           <p:nvPr/>
         </p:nvPicPr>
         <p:blipFill rotWithShape="1">
-          <a:blip r:embed="rId2">
+          <a:blip r:embed="rId4">
             <a:extLst>
               <a:ext uri="{28A0092B-C50C-407E-A947-70E740481C1C}">
                 <a14:useLocalDpi xmlns:a14="http://schemas.microsoft.com/office/drawing/2010/main" val="0"/>
@@ -8947,10 +9165,10 @@
       </p:pic>
       <p:pic>
         <p:nvPicPr>
-          <p:cNvPr id="6" name="Image 5">
+          <p:cNvPr id="10" name="Image 9">
             <a:extLst>
               <a:ext uri="{FF2B5EF4-FFF2-40B4-BE49-F238E27FC236}">
-                <a16:creationId xmlns:a16="http://schemas.microsoft.com/office/drawing/2014/main" id="{7A5D5ABD-4D56-4342-9BCC-52744FFA0A57}"/>
+                <a16:creationId xmlns:a16="http://schemas.microsoft.com/office/drawing/2014/main" id="{AB4966DB-0CC6-45B5-8C70-E6B853B529BE}"/>
               </a:ext>
             </a:extLst>
           </p:cNvPr>
@@ -8960,7 +9178,7 @@
           <p:nvPr/>
         </p:nvPicPr>
         <p:blipFill>
-          <a:blip r:embed="rId3">
+          <a:blip r:embed="rId5">
             <a:extLst>
               <a:ext uri="{28A0092B-C50C-407E-A947-70E740481C1C}">
                 <a14:useLocalDpi xmlns:a14="http://schemas.microsoft.com/office/drawing/2010/main" val="0"/>
@@ -8982,10 +9200,10 @@
       </p:pic>
       <p:sp>
         <p:nvSpPr>
-          <p:cNvPr id="7" name="Espace réservé du numéro de diapositive 6">
+          <p:cNvPr id="4" name="Espace réservé du numéro de diapositive 3">
             <a:extLst>
               <a:ext uri="{FF2B5EF4-FFF2-40B4-BE49-F238E27FC236}">
-                <a16:creationId xmlns:a16="http://schemas.microsoft.com/office/drawing/2014/main" id="{7B1752D2-C8F9-4900-826F-D65896840773}"/>
+                <a16:creationId xmlns:a16="http://schemas.microsoft.com/office/drawing/2014/main" id="{5EFC57C8-DEF7-418C-B6C3-453283024E80}"/>
               </a:ext>
             </a:extLst>
           </p:cNvPr>
@@ -9015,7 +9233,7 @@
     </p:spTree>
     <p:extLst>
       <p:ext uri="{BB962C8B-B14F-4D97-AF65-F5344CB8AC3E}">
-        <p14:creationId xmlns:p14="http://schemas.microsoft.com/office/powerpoint/2010/main" val="2164363200"/>
+        <p14:creationId xmlns:p14="http://schemas.microsoft.com/office/powerpoint/2010/main" val="189909671"/>
       </p:ext>
     </p:extLst>
   </p:cSld>
@@ -9044,10 +9262,10 @@
       </p:grpSpPr>
       <p:sp>
         <p:nvSpPr>
-          <p:cNvPr id="4" name="Titre 3">
+          <p:cNvPr id="2" name="Titre 1">
             <a:extLst>
               <a:ext uri="{FF2B5EF4-FFF2-40B4-BE49-F238E27FC236}">
-                <a16:creationId xmlns:a16="http://schemas.microsoft.com/office/drawing/2014/main" id="{6636789D-216E-47CF-8022-A15E6AB6C752}"/>
+                <a16:creationId xmlns:a16="http://schemas.microsoft.com/office/drawing/2014/main" id="{E1D19F9F-E66D-4541-AF6D-CCA05F856FAA}"/>
               </a:ext>
             </a:extLst>
           </p:cNvPr>
@@ -9055,7 +9273,7 @@
             <a:spLocks noGrp="1"/>
           </p:cNvSpPr>
           <p:nvPr>
-            <p:ph type="ctrTitle"/>
+            <p:ph type="title"/>
           </p:nvPr>
         </p:nvSpPr>
         <p:spPr/>
@@ -9063,22 +9281,19 @@
           <a:bodyPr/>
           <a:lstStyle/>
           <a:p>
-            <a:br>
+            <a:r>
               <a:rPr lang="fr-FR" dirty="0"/>
-            </a:br>
-            <a:r>
-              <a:rPr lang="fr-FR" dirty="0"/>
-              <a:t>Merci de votre écoute</a:t>
-            </a:r>
-          </a:p>
-        </p:txBody>
-      </p:sp>
-      <p:sp>
-        <p:nvSpPr>
-          <p:cNvPr id="5" name="Sous-titre 4">
+              <a:t>Travaux cités</a:t>
+            </a:r>
+          </a:p>
+        </p:txBody>
+      </p:sp>
+      <p:sp>
+        <p:nvSpPr>
+          <p:cNvPr id="3" name="Espace réservé du contenu 2">
             <a:extLst>
               <a:ext uri="{FF2B5EF4-FFF2-40B4-BE49-F238E27FC236}">
-                <a16:creationId xmlns:a16="http://schemas.microsoft.com/office/drawing/2014/main" id="{D69341EB-267D-4A8E-B7AF-7CAB03078F33}"/>
+                <a16:creationId xmlns:a16="http://schemas.microsoft.com/office/drawing/2014/main" id="{F6118C50-6835-43DD-A850-01AABC86E4D1}"/>
               </a:ext>
             </a:extLst>
           </p:cNvPr>
@@ -9086,7 +9301,7 @@
             <a:spLocks noGrp="1"/>
           </p:cNvSpPr>
           <p:nvPr>
-            <p:ph type="subTitle" idx="1"/>
+            <p:ph idx="1"/>
           </p:nvPr>
         </p:nvSpPr>
         <p:spPr/>
@@ -9096,17 +9311,92 @@
           <a:p>
             <a:r>
               <a:rPr lang="fr-FR" dirty="0"/>
-              <a:t>Maintenant place à la démonstration…</a:t>
-            </a:r>
+              <a:t>Jason </a:t>
+            </a:r>
+            <a:r>
+              <a:rPr lang="fr-FR" dirty="0" err="1"/>
+              <a:t>Mahdjoub</a:t>
+            </a:r>
+            <a:r>
+              <a:rPr lang="fr-FR" dirty="0"/>
+              <a:t>, Zahia </a:t>
+            </a:r>
+            <a:r>
+              <a:rPr lang="fr-FR" dirty="0" err="1"/>
+              <a:t>Guessoum</a:t>
+            </a:r>
+            <a:r>
+              <a:rPr lang="fr-FR" dirty="0"/>
+              <a:t>, Fabien Michel, Michel Herbin. A multi-agent </a:t>
+            </a:r>
+            <a:r>
+              <a:rPr lang="fr-FR" dirty="0" err="1"/>
+              <a:t>approach</a:t>
+            </a:r>
+            <a:r>
+              <a:rPr lang="fr-FR" dirty="0"/>
+              <a:t> for the </a:t>
+            </a:r>
+            <a:r>
+              <a:rPr lang="fr-FR" dirty="0" err="1"/>
+              <a:t>edge</a:t>
+            </a:r>
+            <a:r>
+              <a:rPr lang="fr-FR" dirty="0"/>
+              <a:t> </a:t>
+            </a:r>
+            <a:r>
+              <a:rPr lang="fr-FR" dirty="0" err="1"/>
+              <a:t>detection</a:t>
+            </a:r>
+            <a:r>
+              <a:rPr lang="fr-FR" dirty="0"/>
+              <a:t> in image </a:t>
+            </a:r>
+            <a:r>
+              <a:rPr lang="fr-FR" dirty="0" err="1"/>
+              <a:t>processing</a:t>
+            </a:r>
+            <a:r>
+              <a:rPr lang="fr-FR" dirty="0"/>
+              <a:t>. 4th </a:t>
+            </a:r>
+            <a:r>
+              <a:rPr lang="fr-FR" dirty="0" err="1"/>
+              <a:t>European</a:t>
+            </a:r>
+            <a:r>
+              <a:rPr lang="fr-FR" dirty="0"/>
+              <a:t> Workshop on Multi-Agent </a:t>
+            </a:r>
+            <a:r>
+              <a:rPr lang="fr-FR" dirty="0" err="1"/>
+              <a:t>Systems</a:t>
+            </a:r>
+            <a:r>
+              <a:rPr lang="fr-FR" dirty="0"/>
+              <a:t> - EUMAS’06, </a:t>
+            </a:r>
+            <a:r>
+              <a:rPr lang="fr-FR" dirty="0" err="1"/>
+              <a:t>Dec</a:t>
+            </a:r>
+            <a:r>
+              <a:rPr lang="fr-FR" dirty="0"/>
+              <a:t> 2006, Lisbonne, Portugal. hal-02404201</a:t>
+            </a:r>
+          </a:p>
+          <a:p>
+            <a:endParaRPr lang="fr-FR" dirty="0"/>
           </a:p>
         </p:txBody>
       </p:sp>
       <p:pic>
         <p:nvPicPr>
-          <p:cNvPr id="6" name="Image 5">
+          <p:cNvPr id="4" name="Image 3">
             <a:extLst>
               <a:ext uri="{FF2B5EF4-FFF2-40B4-BE49-F238E27FC236}">
-                <a16:creationId xmlns:a16="http://schemas.microsoft.com/office/drawing/2014/main" id="{5E98EF6D-A133-425E-86B4-0379E08D791C}"/>
+                <a16:creationId xmlns:a16="http://schemas.microsoft.com/office/drawing/2014/main" id="{B69D7D5D-5666-43BC-8720-EB29D12AA091}"/>
               </a:ext>
             </a:extLst>
           </p:cNvPr>
@@ -9128,8 +9418,8 @@
         </p:blipFill>
         <p:spPr>
           <a:xfrm>
-            <a:off x="7385481" y="1072679"/>
-            <a:ext cx="2997457" cy="1393722"/>
+            <a:off x="10368379" y="466305"/>
+            <a:ext cx="1595120" cy="741680"/>
           </a:xfrm>
           <a:prstGeom prst="rect">
             <a:avLst/>
@@ -9138,10 +9428,10 @@
       </p:pic>
       <p:pic>
         <p:nvPicPr>
-          <p:cNvPr id="8" name="Image 7">
+          <p:cNvPr id="6" name="Image 5">
             <a:extLst>
               <a:ext uri="{FF2B5EF4-FFF2-40B4-BE49-F238E27FC236}">
-                <a16:creationId xmlns:a16="http://schemas.microsoft.com/office/drawing/2014/main" id="{2AC1CEFE-D90F-4326-A189-B6ADBB983B02}"/>
+                <a16:creationId xmlns:a16="http://schemas.microsoft.com/office/drawing/2014/main" id="{7A5D5ABD-4D56-4342-9BCC-52744FFA0A57}"/>
               </a:ext>
             </a:extLst>
           </p:cNvPr>
@@ -9163,8 +9453,8 @@
         </p:blipFill>
         <p:spPr>
           <a:xfrm>
-            <a:off x="1809062" y="1233375"/>
-            <a:ext cx="2997457" cy="1233026"/>
+            <a:off x="381000" y="510248"/>
+            <a:ext cx="1595120" cy="656164"/>
           </a:xfrm>
           <a:prstGeom prst="rect">
             <a:avLst/>
@@ -9173,10 +9463,10 @@
       </p:pic>
       <p:sp>
         <p:nvSpPr>
-          <p:cNvPr id="9" name="Espace réservé du numéro de diapositive 8">
+          <p:cNvPr id="7" name="Espace réservé du numéro de diapositive 6">
             <a:extLst>
               <a:ext uri="{FF2B5EF4-FFF2-40B4-BE49-F238E27FC236}">
-                <a16:creationId xmlns:a16="http://schemas.microsoft.com/office/drawing/2014/main" id="{FDABCA79-13BB-4AA1-9553-DD587F1BFCA8}"/>
+                <a16:creationId xmlns:a16="http://schemas.microsoft.com/office/drawing/2014/main" id="{7B1752D2-C8F9-4900-826F-D65896840773}"/>
               </a:ext>
             </a:extLst>
           </p:cNvPr>
@@ -9206,7 +9496,7 @@
     </p:spTree>
     <p:extLst>
       <p:ext uri="{BB962C8B-B14F-4D97-AF65-F5344CB8AC3E}">
-        <p14:creationId xmlns:p14="http://schemas.microsoft.com/office/powerpoint/2010/main" val="1740739463"/>
+        <p14:creationId xmlns:p14="http://schemas.microsoft.com/office/powerpoint/2010/main" val="2164363200"/>
       </p:ext>
     </p:extLst>
   </p:cSld>

</xml_diff>